<commit_message>
Adds template to ppt presentation
</commit_message>
<xml_diff>
--- a/powerpoint/access-to-care.pptx
+++ b/powerpoint/access-to-care.pptx
@@ -1,8 +1,8 @@
 
 <file path=ppt/presentation.xml><?xml version="1.0" encoding="utf-8"?>
-<p:presentation xmlns:a="http://schemas.openxmlformats.org/drawingml/2006/main" xmlns:r="http://schemas.openxmlformats.org/officeDocument/2006/relationships" xmlns:p="http://schemas.openxmlformats.org/presentationml/2006/main" saveSubsetFonts="1" autoCompressPictures="0">
+<p:presentation xmlns:a="http://schemas.openxmlformats.org/drawingml/2006/main" xmlns:r="http://schemas.openxmlformats.org/officeDocument/2006/relationships" xmlns:p="http://schemas.openxmlformats.org/presentationml/2006/main" saveSubsetFonts="1">
   <p:sldMasterIdLst>
-    <p:sldMasterId id="2147483648" r:id="rId1"/>
+    <p:sldMasterId id="2147484192" r:id="rId1"/>
   </p:sldMasterIdLst>
   <p:sldIdLst>
     <p:sldId id="256" r:id="rId2"/>
@@ -10,13 +10,13 @@
     <p:sldId id="258" r:id="rId4"/>
     <p:sldId id="259" r:id="rId5"/>
   </p:sldIdLst>
-  <p:sldSz cx="9144000" cy="6858000" type="screen4x3"/>
+  <p:sldSz cx="12192000" cy="6858000"/>
   <p:notesSz cx="6858000" cy="9144000"/>
   <p:defaultTextStyle>
     <a:defPPr>
       <a:defRPr lang="en-US"/>
     </a:defPPr>
-    <a:lvl1pPr marL="0" algn="l" defTabSz="457200" rtl="0" eaLnBrk="1" latinLnBrk="0" hangingPunct="1">
+    <a:lvl1pPr marL="0" algn="l" defTabSz="914400" rtl="0" eaLnBrk="1" latinLnBrk="0" hangingPunct="1">
       <a:defRPr sz="1800" kern="1200">
         <a:solidFill>
           <a:schemeClr val="tx1"/>
@@ -26,7 +26,7 @@
         <a:cs typeface="+mn-cs"/>
       </a:defRPr>
     </a:lvl1pPr>
-    <a:lvl2pPr marL="457200" algn="l" defTabSz="457200" rtl="0" eaLnBrk="1" latinLnBrk="0" hangingPunct="1">
+    <a:lvl2pPr marL="457200" algn="l" defTabSz="914400" rtl="0" eaLnBrk="1" latinLnBrk="0" hangingPunct="1">
       <a:defRPr sz="1800" kern="1200">
         <a:solidFill>
           <a:schemeClr val="tx1"/>
@@ -36,7 +36,7 @@
         <a:cs typeface="+mn-cs"/>
       </a:defRPr>
     </a:lvl2pPr>
-    <a:lvl3pPr marL="914400" algn="l" defTabSz="457200" rtl="0" eaLnBrk="1" latinLnBrk="0" hangingPunct="1">
+    <a:lvl3pPr marL="914400" algn="l" defTabSz="914400" rtl="0" eaLnBrk="1" latinLnBrk="0" hangingPunct="1">
       <a:defRPr sz="1800" kern="1200">
         <a:solidFill>
           <a:schemeClr val="tx1"/>
@@ -46,7 +46,7 @@
         <a:cs typeface="+mn-cs"/>
       </a:defRPr>
     </a:lvl3pPr>
-    <a:lvl4pPr marL="1371600" algn="l" defTabSz="457200" rtl="0" eaLnBrk="1" latinLnBrk="0" hangingPunct="1">
+    <a:lvl4pPr marL="1371600" algn="l" defTabSz="914400" rtl="0" eaLnBrk="1" latinLnBrk="0" hangingPunct="1">
       <a:defRPr sz="1800" kern="1200">
         <a:solidFill>
           <a:schemeClr val="tx1"/>
@@ -56,7 +56,7 @@
         <a:cs typeface="+mn-cs"/>
       </a:defRPr>
     </a:lvl4pPr>
-    <a:lvl5pPr marL="1828800" algn="l" defTabSz="457200" rtl="0" eaLnBrk="1" latinLnBrk="0" hangingPunct="1">
+    <a:lvl5pPr marL="1828800" algn="l" defTabSz="914400" rtl="0" eaLnBrk="1" latinLnBrk="0" hangingPunct="1">
       <a:defRPr sz="1800" kern="1200">
         <a:solidFill>
           <a:schemeClr val="tx1"/>
@@ -66,7 +66,7 @@
         <a:cs typeface="+mn-cs"/>
       </a:defRPr>
     </a:lvl5pPr>
-    <a:lvl6pPr marL="2286000" algn="l" defTabSz="457200" rtl="0" eaLnBrk="1" latinLnBrk="0" hangingPunct="1">
+    <a:lvl6pPr marL="2286000" algn="l" defTabSz="914400" rtl="0" eaLnBrk="1" latinLnBrk="0" hangingPunct="1">
       <a:defRPr sz="1800" kern="1200">
         <a:solidFill>
           <a:schemeClr val="tx1"/>
@@ -76,7 +76,7 @@
         <a:cs typeface="+mn-cs"/>
       </a:defRPr>
     </a:lvl6pPr>
-    <a:lvl7pPr marL="2743200" algn="l" defTabSz="457200" rtl="0" eaLnBrk="1" latinLnBrk="0" hangingPunct="1">
+    <a:lvl7pPr marL="2743200" algn="l" defTabSz="914400" rtl="0" eaLnBrk="1" latinLnBrk="0" hangingPunct="1">
       <a:defRPr sz="1800" kern="1200">
         <a:solidFill>
           <a:schemeClr val="tx1"/>
@@ -86,7 +86,7 @@
         <a:cs typeface="+mn-cs"/>
       </a:defRPr>
     </a:lvl7pPr>
-    <a:lvl8pPr marL="3200400" algn="l" defTabSz="457200" rtl="0" eaLnBrk="1" latinLnBrk="0" hangingPunct="1">
+    <a:lvl8pPr marL="3200400" algn="l" defTabSz="914400" rtl="0" eaLnBrk="1" latinLnBrk="0" hangingPunct="1">
       <a:defRPr sz="1800" kern="1200">
         <a:solidFill>
           <a:schemeClr val="tx1"/>
@@ -96,7 +96,7 @@
         <a:cs typeface="+mn-cs"/>
       </a:defRPr>
     </a:lvl8pPr>
-    <a:lvl9pPr marL="3657600" algn="l" defTabSz="457200" rtl="0" eaLnBrk="1" latinLnBrk="0" hangingPunct="1">
+    <a:lvl9pPr marL="3657600" algn="l" defTabSz="914400" rtl="0" eaLnBrk="1" latinLnBrk="0" hangingPunct="1">
       <a:defRPr sz="1800" kern="1200">
         <a:solidFill>
           <a:schemeClr val="tx1"/>
@@ -109,18 +109,7 @@
   </p:defaultTextStyle>
   <p:extLst>
     <p:ext uri="{EFAFB233-063F-42B5-8137-9DF3F51BA10A}">
-      <p15:sldGuideLst xmlns:p15="http://schemas.microsoft.com/office/powerpoint/2012/main">
-        <p15:guide id="1" orient="horz" pos="2160">
-          <p15:clr>
-            <a:srgbClr val="A4A3A4"/>
-          </p15:clr>
-        </p15:guide>
-        <p15:guide id="2" pos="2880">
-          <p15:clr>
-            <a:srgbClr val="A4A3A4"/>
-          </p15:clr>
-        </p15:guide>
-      </p15:sldGuideLst>
+      <p15:sldGuideLst xmlns:p15="http://schemas.microsoft.com/office/powerpoint/2012/main"/>
     </p:ext>
   </p:extLst>
 </p:presentation>
@@ -145,29 +134,84 @@
       </p:grpSpPr>
       <p:sp>
         <p:nvSpPr>
-          <p:cNvPr id="2" name="Title 1"/>
-          <p:cNvSpPr>
-            <a:spLocks noGrp="1"/>
-          </p:cNvSpPr>
-          <p:nvPr>
-            <p:ph type="ctrTitle"/>
-          </p:nvPr>
+          <p:cNvPr id="7" name="Rectangle 6"/>
+          <p:cNvSpPr>
+            <a:spLocks noChangeAspect="1"/>
+          </p:cNvSpPr>
+          <p:nvPr/>
         </p:nvSpPr>
         <p:spPr>
           <a:xfrm>
-            <a:off x="685800" y="2130425"/>
-            <a:ext cx="7772400" cy="1470025"/>
+            <a:off x="231140" y="243840"/>
+            <a:ext cx="11724640" cy="6377939"/>
+          </a:xfrm>
+          <a:prstGeom prst="rect">
+            <a:avLst/>
+          </a:prstGeom>
+          <a:solidFill>
+            <a:schemeClr val="accent1"/>
+          </a:solidFill>
+          <a:ln w="12700">
+            <a:solidFill>
+              <a:srgbClr val="FFFFFF"/>
+            </a:solidFill>
+          </a:ln>
+        </p:spPr>
+        <p:style>
+          <a:lnRef idx="2">
+            <a:schemeClr val="accent1">
+              <a:shade val="50000"/>
+            </a:schemeClr>
+          </a:lnRef>
+          <a:fillRef idx="1">
+            <a:schemeClr val="accent1"/>
+          </a:fillRef>
+          <a:effectRef idx="0">
+            <a:schemeClr val="accent1"/>
+          </a:effectRef>
+          <a:fontRef idx="minor">
+            <a:schemeClr val="lt1"/>
+          </a:fontRef>
+        </p:style>
+      </p:sp>
+      <p:sp>
+        <p:nvSpPr>
+          <p:cNvPr id="2" name="Title 1"/>
+          <p:cNvSpPr>
+            <a:spLocks noGrp="1"/>
+          </p:cNvSpPr>
+          <p:nvPr>
+            <p:ph type="ctrTitle"/>
+          </p:nvPr>
+        </p:nvSpPr>
+        <p:spPr>
+          <a:xfrm>
+            <a:off x="1109980" y="882376"/>
+            <a:ext cx="9966960" cy="2926080"/>
           </a:xfrm>
         </p:spPr>
         <p:txBody>
-          <a:bodyPr/>
-          <a:lstStyle/>
-          <a:p>
-            <a:r>
-              <a:rPr lang="en-US" smtClean="0"/>
+          <a:bodyPr anchor="b">
+            <a:normAutofit/>
+          </a:bodyPr>
+          <a:lstStyle>
+            <a:lvl1pPr algn="ctr">
+              <a:lnSpc>
+                <a:spcPct val="85000"/>
+              </a:lnSpc>
+              <a:defRPr sz="7200" b="1" cap="all" baseline="0">
+                <a:solidFill>
+                  <a:srgbClr val="FFFFFF"/>
+                </a:solidFill>
+              </a:defRPr>
+            </a:lvl1pPr>
+          </a:lstStyle>
+          <a:p>
+            <a:r>
+              <a:rPr lang="en-US"/>
               <a:t>Click to edit Master title style</a:t>
             </a:r>
-            <a:endParaRPr lang="en-US"/>
+            <a:endParaRPr lang="en-US" dirty="0"/>
           </a:p>
         </p:txBody>
       </p:sp>
@@ -183,182 +227,193 @@
         </p:nvSpPr>
         <p:spPr>
           <a:xfrm>
-            <a:off x="1371600" y="3886200"/>
-            <a:ext cx="6400800" cy="1752600"/>
+            <a:off x="1709530" y="3869634"/>
+            <a:ext cx="8767860" cy="1388165"/>
           </a:xfrm>
         </p:spPr>
         <p:txBody>
-          <a:bodyPr/>
+          <a:bodyPr>
+            <a:normAutofit/>
+          </a:bodyPr>
           <a:lstStyle>
             <a:lvl1pPr marL="0" indent="0" algn="ctr">
               <a:buNone/>
-              <a:defRPr>
+              <a:defRPr sz="2200">
                 <a:solidFill>
-                  <a:schemeClr val="tx1">
-                    <a:tint val="75000"/>
-                  </a:schemeClr>
+                  <a:srgbClr val="FFFFFF"/>
                 </a:solidFill>
               </a:defRPr>
             </a:lvl1pPr>
             <a:lvl2pPr marL="457200" indent="0" algn="ctr">
               <a:buNone/>
+              <a:defRPr sz="2200"/>
+            </a:lvl2pPr>
+            <a:lvl3pPr marL="914400" indent="0" algn="ctr">
+              <a:buNone/>
+              <a:defRPr sz="2200"/>
+            </a:lvl3pPr>
+            <a:lvl4pPr marL="1371600" indent="0" algn="ctr">
+              <a:buNone/>
+              <a:defRPr sz="2000"/>
+            </a:lvl4pPr>
+            <a:lvl5pPr marL="1828800" indent="0" algn="ctr">
+              <a:buNone/>
+              <a:defRPr sz="2000"/>
+            </a:lvl5pPr>
+            <a:lvl6pPr marL="2286000" indent="0" algn="ctr">
+              <a:buNone/>
+              <a:defRPr sz="2000"/>
+            </a:lvl6pPr>
+            <a:lvl7pPr marL="2743200" indent="0" algn="ctr">
+              <a:buNone/>
+              <a:defRPr sz="2000"/>
+            </a:lvl7pPr>
+            <a:lvl8pPr marL="3200400" indent="0" algn="ctr">
+              <a:buNone/>
+              <a:defRPr sz="2000"/>
+            </a:lvl8pPr>
+            <a:lvl9pPr marL="3657600" indent="0" algn="ctr">
+              <a:buNone/>
+              <a:defRPr sz="2000"/>
+            </a:lvl9pPr>
+          </a:lstStyle>
+          <a:p>
+            <a:r>
+              <a:rPr lang="en-US"/>
+              <a:t>Click to edit Master subtitle style</a:t>
+            </a:r>
+            <a:endParaRPr lang="en-US" dirty="0"/>
+          </a:p>
+        </p:txBody>
+      </p:sp>
+      <p:sp>
+        <p:nvSpPr>
+          <p:cNvPr id="4" name="Date Placeholder 3"/>
+          <p:cNvSpPr>
+            <a:spLocks noGrp="1"/>
+          </p:cNvSpPr>
+          <p:nvPr>
+            <p:ph type="dt" sz="half" idx="10"/>
+          </p:nvPr>
+        </p:nvSpPr>
+        <p:spPr/>
+        <p:txBody>
+          <a:bodyPr/>
+          <a:lstStyle>
+            <a:lvl1pPr>
               <a:defRPr>
                 <a:solidFill>
-                  <a:schemeClr val="tx1">
-                    <a:tint val="75000"/>
-                  </a:schemeClr>
+                  <a:srgbClr val="FFFFFF"/>
                 </a:solidFill>
               </a:defRPr>
-            </a:lvl2pPr>
-            <a:lvl3pPr marL="914400" indent="0" algn="ctr">
-              <a:buNone/>
+            </a:lvl1pPr>
+          </a:lstStyle>
+          <a:p>
+            <a:fld id="{96DFF08F-DC6B-4601-B491-B0F83F6DD2DA}" type="datetimeFigureOut">
+              <a:rPr lang="en-US" dirty="0"/>
+              <a:t>3/31/2019</a:t>
+            </a:fld>
+            <a:endParaRPr lang="en-US" dirty="0"/>
+          </a:p>
+        </p:txBody>
+      </p:sp>
+      <p:sp>
+        <p:nvSpPr>
+          <p:cNvPr id="5" name="Footer Placeholder 4"/>
+          <p:cNvSpPr>
+            <a:spLocks noGrp="1"/>
+          </p:cNvSpPr>
+          <p:nvPr>
+            <p:ph type="ftr" sz="quarter" idx="11"/>
+          </p:nvPr>
+        </p:nvSpPr>
+        <p:spPr/>
+        <p:txBody>
+          <a:bodyPr/>
+          <a:lstStyle>
+            <a:lvl1pPr>
               <a:defRPr>
                 <a:solidFill>
-                  <a:schemeClr val="tx1">
-                    <a:tint val="75000"/>
-                  </a:schemeClr>
+                  <a:srgbClr val="FFFFFF"/>
                 </a:solidFill>
               </a:defRPr>
-            </a:lvl3pPr>
-            <a:lvl4pPr marL="1371600" indent="0" algn="ctr">
-              <a:buNone/>
+            </a:lvl1pPr>
+          </a:lstStyle>
+          <a:p>
+            <a:endParaRPr lang="en-US" dirty="0"/>
+          </a:p>
+        </p:txBody>
+      </p:sp>
+      <p:sp>
+        <p:nvSpPr>
+          <p:cNvPr id="6" name="Slide Number Placeholder 5"/>
+          <p:cNvSpPr>
+            <a:spLocks noGrp="1"/>
+          </p:cNvSpPr>
+          <p:nvPr>
+            <p:ph type="sldNum" sz="quarter" idx="12"/>
+          </p:nvPr>
+        </p:nvSpPr>
+        <p:spPr/>
+        <p:txBody>
+          <a:bodyPr/>
+          <a:lstStyle>
+            <a:lvl1pPr>
               <a:defRPr>
                 <a:solidFill>
-                  <a:schemeClr val="tx1">
-                    <a:tint val="75000"/>
-                  </a:schemeClr>
+                  <a:srgbClr val="FFFFFF"/>
                 </a:solidFill>
               </a:defRPr>
-            </a:lvl4pPr>
-            <a:lvl5pPr marL="1828800" indent="0" algn="ctr">
-              <a:buNone/>
-              <a:defRPr>
-                <a:solidFill>
-                  <a:schemeClr val="tx1">
-                    <a:tint val="75000"/>
-                  </a:schemeClr>
-                </a:solidFill>
-              </a:defRPr>
-            </a:lvl5pPr>
-            <a:lvl6pPr marL="2286000" indent="0" algn="ctr">
-              <a:buNone/>
-              <a:defRPr>
-                <a:solidFill>
-                  <a:schemeClr val="tx1">
-                    <a:tint val="75000"/>
-                  </a:schemeClr>
-                </a:solidFill>
-              </a:defRPr>
-            </a:lvl6pPr>
-            <a:lvl7pPr marL="2743200" indent="0" algn="ctr">
-              <a:buNone/>
-              <a:defRPr>
-                <a:solidFill>
-                  <a:schemeClr val="tx1">
-                    <a:tint val="75000"/>
-                  </a:schemeClr>
-                </a:solidFill>
-              </a:defRPr>
-            </a:lvl7pPr>
-            <a:lvl8pPr marL="3200400" indent="0" algn="ctr">
-              <a:buNone/>
-              <a:defRPr>
-                <a:solidFill>
-                  <a:schemeClr val="tx1">
-                    <a:tint val="75000"/>
-                  </a:schemeClr>
-                </a:solidFill>
-              </a:defRPr>
-            </a:lvl8pPr>
-            <a:lvl9pPr marL="3657600" indent="0" algn="ctr">
-              <a:buNone/>
-              <a:defRPr>
-                <a:solidFill>
-                  <a:schemeClr val="tx1">
-                    <a:tint val="75000"/>
-                  </a:schemeClr>
-                </a:solidFill>
-              </a:defRPr>
-            </a:lvl9pPr>
+            </a:lvl1pPr>
           </a:lstStyle>
           <a:p>
-            <a:r>
-              <a:rPr lang="en-US" smtClean="0"/>
-              <a:t>Click to edit Master subtitle style</a:t>
-            </a:r>
-            <a:endParaRPr lang="en-US"/>
-          </a:p>
-        </p:txBody>
-      </p:sp>
-      <p:sp>
-        <p:nvSpPr>
-          <p:cNvPr id="4" name="Date Placeholder 3"/>
-          <p:cNvSpPr>
-            <a:spLocks noGrp="1"/>
-          </p:cNvSpPr>
-          <p:nvPr>
-            <p:ph type="dt" sz="half" idx="10"/>
-          </p:nvPr>
-        </p:nvSpPr>
-        <p:spPr/>
-        <p:txBody>
-          <a:bodyPr/>
-          <a:lstStyle/>
-          <a:p>
-            <a:fld id="{241EB5C9-1307-BA42-ABA2-0BC069CD8E7F}" type="datetimeFigureOut">
-              <a:rPr lang="en-US" smtClean="0"/>
-              <a:t>2/17/2018</a:t>
-            </a:fld>
-            <a:endParaRPr lang="en-US"/>
-          </a:p>
-        </p:txBody>
-      </p:sp>
-      <p:sp>
-        <p:nvSpPr>
-          <p:cNvPr id="5" name="Footer Placeholder 4"/>
-          <p:cNvSpPr>
-            <a:spLocks noGrp="1"/>
-          </p:cNvSpPr>
-          <p:nvPr>
-            <p:ph type="ftr" sz="quarter" idx="11"/>
-          </p:nvPr>
-        </p:nvSpPr>
-        <p:spPr/>
-        <p:txBody>
-          <a:bodyPr/>
-          <a:lstStyle/>
-          <a:p>
-            <a:endParaRPr lang="en-US"/>
-          </a:p>
-        </p:txBody>
-      </p:sp>
-      <p:sp>
-        <p:nvSpPr>
-          <p:cNvPr id="6" name="Slide Number Placeholder 5"/>
-          <p:cNvSpPr>
-            <a:spLocks noGrp="1"/>
-          </p:cNvSpPr>
-          <p:nvPr>
-            <p:ph type="sldNum" sz="quarter" idx="12"/>
-          </p:nvPr>
-        </p:nvSpPr>
-        <p:spPr/>
-        <p:txBody>
-          <a:bodyPr/>
-          <a:lstStyle/>
-          <a:p>
-            <a:fld id="{C5EF2332-01BF-834F-8236-50238282D533}" type="slidenum">
-              <a:rPr lang="en-US" smtClean="0"/>
+            <a:fld id="{4FAB73BC-B049-4115-A692-8D63A059BFB8}" type="slidenum">
+              <a:rPr lang="en-US" dirty="0"/>
               <a:t>‹#›</a:t>
             </a:fld>
-            <a:endParaRPr lang="en-US"/>
-          </a:p>
-        </p:txBody>
-      </p:sp>
+            <a:endParaRPr lang="en-US" dirty="0"/>
+          </a:p>
+        </p:txBody>
+      </p:sp>
+      <p:cxnSp>
+        <p:nvCxnSpPr>
+          <p:cNvPr id="8" name="Straight Connector 7"/>
+          <p:cNvCxnSpPr/>
+          <p:nvPr/>
+        </p:nvCxnSpPr>
+        <p:spPr>
+          <a:xfrm>
+            <a:off x="1978660" y="3733800"/>
+            <a:ext cx="8229601" cy="0"/>
+          </a:xfrm>
+          <a:prstGeom prst="line">
+            <a:avLst/>
+          </a:prstGeom>
+          <a:ln>
+            <a:solidFill>
+              <a:srgbClr val="FFFFFF"/>
+            </a:solidFill>
+          </a:ln>
+        </p:spPr>
+        <p:style>
+          <a:lnRef idx="1">
+            <a:schemeClr val="accent1"/>
+          </a:lnRef>
+          <a:fillRef idx="0">
+            <a:schemeClr val="accent1"/>
+          </a:fillRef>
+          <a:effectRef idx="0">
+            <a:schemeClr val="accent1"/>
+          </a:effectRef>
+          <a:fontRef idx="minor">
+            <a:schemeClr val="tx1"/>
+          </a:fontRef>
+        </p:style>
+      </p:cxnSp>
     </p:spTree>
     <p:extLst>
       <p:ext uri="{BB962C8B-B14F-4D97-AF65-F5344CB8AC3E}">
-        <p14:creationId xmlns:p14="http://schemas.microsoft.com/office/powerpoint/2010/main" val="1444357513"/>
+        <p14:creationId xmlns:p14="http://schemas.microsoft.com/office/powerpoint/2010/main" val="3735545233"/>
       </p:ext>
     </p:extLst>
   </p:cSld>
@@ -401,10 +456,10 @@
           <a:lstStyle/>
           <a:p>
             <a:r>
-              <a:rPr lang="en-US" smtClean="0"/>
+              <a:rPr lang="en-US"/>
               <a:t>Click to edit Master title style</a:t>
             </a:r>
-            <a:endParaRPr lang="en-US"/>
+            <a:endParaRPr lang="en-US" dirty="0"/>
           </a:p>
         </p:txBody>
       </p:sp>
@@ -425,38 +480,38 @@
           <a:p>
             <a:pPr lvl="0"/>
             <a:r>
-              <a:rPr lang="en-US" smtClean="0"/>
+              <a:rPr lang="en-US"/>
               <a:t>Click to edit Master text styles</a:t>
             </a:r>
           </a:p>
           <a:p>
             <a:pPr lvl="1"/>
             <a:r>
-              <a:rPr lang="en-US" smtClean="0"/>
+              <a:rPr lang="en-US"/>
               <a:t>Second level</a:t>
             </a:r>
           </a:p>
           <a:p>
             <a:pPr lvl="2"/>
             <a:r>
-              <a:rPr lang="en-US" smtClean="0"/>
+              <a:rPr lang="en-US"/>
               <a:t>Third level</a:t>
             </a:r>
           </a:p>
           <a:p>
             <a:pPr lvl="3"/>
             <a:r>
-              <a:rPr lang="en-US" smtClean="0"/>
+              <a:rPr lang="en-US"/>
               <a:t>Fourth level</a:t>
             </a:r>
           </a:p>
           <a:p>
             <a:pPr lvl="4"/>
             <a:r>
-              <a:rPr lang="en-US" smtClean="0"/>
+              <a:rPr lang="en-US"/>
               <a:t>Fifth level</a:t>
             </a:r>
-            <a:endParaRPr lang="en-US"/>
+            <a:endParaRPr lang="en-US" dirty="0"/>
           </a:p>
         </p:txBody>
       </p:sp>
@@ -475,11 +530,11 @@
           <a:bodyPr/>
           <a:lstStyle/>
           <a:p>
-            <a:fld id="{241EB5C9-1307-BA42-ABA2-0BC069CD8E7F}" type="datetimeFigureOut">
-              <a:rPr lang="en-US" smtClean="0"/>
-              <a:t>2/17/2018</a:t>
+            <a:fld id="{96DFF08F-DC6B-4601-B491-B0F83F6DD2DA}" type="datetimeFigureOut">
+              <a:rPr lang="en-US" dirty="0"/>
+              <a:t>3/31/2019</a:t>
             </a:fld>
-            <a:endParaRPr lang="en-US"/>
+            <a:endParaRPr lang="en-US" dirty="0"/>
           </a:p>
         </p:txBody>
       </p:sp>
@@ -498,7 +553,7 @@
           <a:bodyPr/>
           <a:lstStyle/>
           <a:p>
-            <a:endParaRPr lang="en-US"/>
+            <a:endParaRPr lang="en-US" dirty="0"/>
           </a:p>
         </p:txBody>
       </p:sp>
@@ -517,18 +572,18 @@
           <a:bodyPr/>
           <a:lstStyle/>
           <a:p>
-            <a:fld id="{C5EF2332-01BF-834F-8236-50238282D533}" type="slidenum">
-              <a:rPr lang="en-US" smtClean="0"/>
+            <a:fld id="{4FAB73BC-B049-4115-A692-8D63A059BFB8}" type="slidenum">
+              <a:rPr lang="en-US" dirty="0"/>
               <a:t>‹#›</a:t>
             </a:fld>
-            <a:endParaRPr lang="en-US"/>
+            <a:endParaRPr lang="en-US" dirty="0"/>
           </a:p>
         </p:txBody>
       </p:sp>
     </p:spTree>
     <p:extLst>
       <p:ext uri="{BB962C8B-B14F-4D97-AF65-F5344CB8AC3E}">
-        <p14:creationId xmlns:p14="http://schemas.microsoft.com/office/powerpoint/2010/main" val="313914798"/>
+        <p14:creationId xmlns:p14="http://schemas.microsoft.com/office/powerpoint/2010/main" val="699026015"/>
       </p:ext>
     </p:extLst>
   </p:cSld>
@@ -567,8 +622,8 @@
         </p:nvSpPr>
         <p:spPr>
           <a:xfrm>
-            <a:off x="6629400" y="274638"/>
-            <a:ext cx="2057400" cy="5851525"/>
+            <a:off x="8724900" y="762000"/>
+            <a:ext cx="2324100" cy="5410200"/>
           </a:xfrm>
         </p:spPr>
         <p:txBody>
@@ -576,10 +631,10 @@
           <a:lstStyle/>
           <a:p>
             <a:r>
-              <a:rPr lang="en-US" smtClean="0"/>
+              <a:rPr lang="en-US"/>
               <a:t>Click to edit Master title style</a:t>
             </a:r>
-            <a:endParaRPr lang="en-US"/>
+            <a:endParaRPr lang="en-US" dirty="0"/>
           </a:p>
         </p:txBody>
       </p:sp>
@@ -595,8 +650,8 @@
         </p:nvSpPr>
         <p:spPr>
           <a:xfrm>
-            <a:off x="457200" y="274638"/>
-            <a:ext cx="6019800" cy="5851525"/>
+            <a:off x="1143000" y="762000"/>
+            <a:ext cx="7429500" cy="5410200"/>
           </a:xfrm>
         </p:spPr>
         <p:txBody>
@@ -605,38 +660,38 @@
           <a:p>
             <a:pPr lvl="0"/>
             <a:r>
-              <a:rPr lang="en-US" smtClean="0"/>
+              <a:rPr lang="en-US"/>
               <a:t>Click to edit Master text styles</a:t>
             </a:r>
           </a:p>
           <a:p>
             <a:pPr lvl="1"/>
             <a:r>
-              <a:rPr lang="en-US" smtClean="0"/>
+              <a:rPr lang="en-US"/>
               <a:t>Second level</a:t>
             </a:r>
           </a:p>
           <a:p>
             <a:pPr lvl="2"/>
             <a:r>
-              <a:rPr lang="en-US" smtClean="0"/>
+              <a:rPr lang="en-US"/>
               <a:t>Third level</a:t>
             </a:r>
           </a:p>
           <a:p>
             <a:pPr lvl="3"/>
             <a:r>
-              <a:rPr lang="en-US" smtClean="0"/>
+              <a:rPr lang="en-US"/>
               <a:t>Fourth level</a:t>
             </a:r>
           </a:p>
           <a:p>
             <a:pPr lvl="4"/>
             <a:r>
-              <a:rPr lang="en-US" smtClean="0"/>
+              <a:rPr lang="en-US"/>
               <a:t>Fifth level</a:t>
             </a:r>
-            <a:endParaRPr lang="en-US"/>
+            <a:endParaRPr lang="en-US" dirty="0"/>
           </a:p>
         </p:txBody>
       </p:sp>
@@ -655,11 +710,11 @@
           <a:bodyPr/>
           <a:lstStyle/>
           <a:p>
-            <a:fld id="{241EB5C9-1307-BA42-ABA2-0BC069CD8E7F}" type="datetimeFigureOut">
-              <a:rPr lang="en-US" smtClean="0"/>
-              <a:t>2/17/2018</a:t>
+            <a:fld id="{96DFF08F-DC6B-4601-B491-B0F83F6DD2DA}" type="datetimeFigureOut">
+              <a:rPr lang="en-US" dirty="0"/>
+              <a:t>3/31/2019</a:t>
             </a:fld>
-            <a:endParaRPr lang="en-US"/>
+            <a:endParaRPr lang="en-US" dirty="0"/>
           </a:p>
         </p:txBody>
       </p:sp>
@@ -678,7 +733,7 @@
           <a:bodyPr/>
           <a:lstStyle/>
           <a:p>
-            <a:endParaRPr lang="en-US"/>
+            <a:endParaRPr lang="en-US" dirty="0"/>
           </a:p>
         </p:txBody>
       </p:sp>
@@ -697,18 +752,18 @@
           <a:bodyPr/>
           <a:lstStyle/>
           <a:p>
-            <a:fld id="{C5EF2332-01BF-834F-8236-50238282D533}" type="slidenum">
-              <a:rPr lang="en-US" smtClean="0"/>
+            <a:fld id="{4FAB73BC-B049-4115-A692-8D63A059BFB8}" type="slidenum">
+              <a:rPr lang="en-US" dirty="0"/>
               <a:t>‹#›</a:t>
             </a:fld>
-            <a:endParaRPr lang="en-US"/>
+            <a:endParaRPr lang="en-US" dirty="0"/>
           </a:p>
         </p:txBody>
       </p:sp>
     </p:spTree>
     <p:extLst>
       <p:ext uri="{BB962C8B-B14F-4D97-AF65-F5344CB8AC3E}">
-        <p14:creationId xmlns:p14="http://schemas.microsoft.com/office/powerpoint/2010/main" val="2581529045"/>
+        <p14:creationId xmlns:p14="http://schemas.microsoft.com/office/powerpoint/2010/main" val="3953034193"/>
       </p:ext>
     </p:extLst>
   </p:cSld>
@@ -719,7 +774,7 @@
 </file>
 
 <file path=ppt/slideLayouts/slideLayout2.xml><?xml version="1.0" encoding="utf-8"?>
-<p:sldLayout xmlns:a="http://schemas.openxmlformats.org/drawingml/2006/main" xmlns:r="http://schemas.openxmlformats.org/officeDocument/2006/relationships" xmlns:p="http://schemas.openxmlformats.org/presentationml/2006/main" type="obj" preserve="1">
+<p:sldLayout xmlns:a="http://schemas.openxmlformats.org/drawingml/2006/main" xmlns:r="http://schemas.openxmlformats.org/officeDocument/2006/relationships" xmlns:p="http://schemas.openxmlformats.org/presentationml/2006/main" preserve="1" userDrawn="1">
   <p:cSld name="Title and Content">
     <p:spTree>
       <p:nvGrpSpPr>
@@ -751,62 +806,9 @@
           <a:lstStyle/>
           <a:p>
             <a:r>
-              <a:rPr lang="en-US" smtClean="0"/>
+              <a:rPr lang="en-US" dirty="0"/>
               <a:t>Click to edit Master title style</a:t>
             </a:r>
-            <a:endParaRPr lang="en-US"/>
-          </a:p>
-        </p:txBody>
-      </p:sp>
-      <p:sp>
-        <p:nvSpPr>
-          <p:cNvPr id="3" name="Content Placeholder 2"/>
-          <p:cNvSpPr>
-            <a:spLocks noGrp="1"/>
-          </p:cNvSpPr>
-          <p:nvPr>
-            <p:ph idx="1"/>
-          </p:nvPr>
-        </p:nvSpPr>
-        <p:spPr/>
-        <p:txBody>
-          <a:bodyPr/>
-          <a:lstStyle/>
-          <a:p>
-            <a:pPr lvl="0"/>
-            <a:r>
-              <a:rPr lang="en-US" smtClean="0"/>
-              <a:t>Click to edit Master text styles</a:t>
-            </a:r>
-          </a:p>
-          <a:p>
-            <a:pPr lvl="1"/>
-            <a:r>
-              <a:rPr lang="en-US" smtClean="0"/>
-              <a:t>Second level</a:t>
-            </a:r>
-          </a:p>
-          <a:p>
-            <a:pPr lvl="2"/>
-            <a:r>
-              <a:rPr lang="en-US" smtClean="0"/>
-              <a:t>Third level</a:t>
-            </a:r>
-          </a:p>
-          <a:p>
-            <a:pPr lvl="3"/>
-            <a:r>
-              <a:rPr lang="en-US" smtClean="0"/>
-              <a:t>Fourth level</a:t>
-            </a:r>
-          </a:p>
-          <a:p>
-            <a:pPr lvl="4"/>
-            <a:r>
-              <a:rPr lang="en-US" smtClean="0"/>
-              <a:t>Fifth level</a:t>
-            </a:r>
-            <a:endParaRPr lang="en-US"/>
           </a:p>
         </p:txBody>
       </p:sp>
@@ -825,11 +827,11 @@
           <a:bodyPr/>
           <a:lstStyle/>
           <a:p>
-            <a:fld id="{241EB5C9-1307-BA42-ABA2-0BC069CD8E7F}" type="datetimeFigureOut">
-              <a:rPr lang="en-US" smtClean="0"/>
-              <a:t>2/17/2018</a:t>
+            <a:fld id="{96DFF08F-DC6B-4601-B491-B0F83F6DD2DA}" type="datetimeFigureOut">
+              <a:rPr lang="en-US" dirty="0"/>
+              <a:t>3/31/2019</a:t>
             </a:fld>
-            <a:endParaRPr lang="en-US"/>
+            <a:endParaRPr lang="en-US" dirty="0"/>
           </a:p>
         </p:txBody>
       </p:sp>
@@ -848,7 +850,7 @@
           <a:bodyPr/>
           <a:lstStyle/>
           <a:p>
-            <a:endParaRPr lang="en-US"/>
+            <a:endParaRPr lang="en-US" dirty="0"/>
           </a:p>
         </p:txBody>
       </p:sp>
@@ -862,23 +864,69 @@
             <p:ph type="sldNum" sz="quarter" idx="12"/>
           </p:nvPr>
         </p:nvSpPr>
-        <p:spPr/>
-        <p:txBody>
-          <a:bodyPr/>
-          <a:lstStyle/>
-          <a:p>
-            <a:fld id="{C5EF2332-01BF-834F-8236-50238282D533}" type="slidenum">
-              <a:rPr lang="en-US" smtClean="0"/>
+        <p:spPr>
+          <a:xfrm>
+            <a:off x="9329530" y="6223828"/>
+            <a:ext cx="1706217" cy="365125"/>
+          </a:xfrm>
+        </p:spPr>
+        <p:txBody>
+          <a:bodyPr/>
+          <a:lstStyle/>
+          <a:p>
+            <a:fld id="{4FAB73BC-B049-4115-A692-8D63A059BFB8}" type="slidenum">
+              <a:rPr lang="en-US" dirty="0"/>
               <a:t>‹#›</a:t>
             </a:fld>
-            <a:endParaRPr lang="en-US"/>
+            <a:endParaRPr lang="en-US" dirty="0"/>
+          </a:p>
+        </p:txBody>
+      </p:sp>
+      <p:sp>
+        <p:nvSpPr>
+          <p:cNvPr id="8" name="Text Placeholder 2">
+            <a:extLst>
+              <a:ext uri="{FF2B5EF4-FFF2-40B4-BE49-F238E27FC236}">
+                <a16:creationId xmlns:a16="http://schemas.microsoft.com/office/drawing/2014/main" id="{40AB4180-BC29-450C-85BC-984099FB6C8A}"/>
+              </a:ext>
+            </a:extLst>
+          </p:cNvPr>
+          <p:cNvSpPr>
+            <a:spLocks noGrp="1"/>
+          </p:cNvSpPr>
+          <p:nvPr>
+            <p:ph idx="1"/>
+          </p:nvPr>
+        </p:nvSpPr>
+        <p:spPr>
+          <a:xfrm>
+            <a:off x="387706" y="1404517"/>
+            <a:ext cx="11397081" cy="4710989"/>
+          </a:xfrm>
+          <a:prstGeom prst="rect">
+            <a:avLst/>
+          </a:prstGeom>
+        </p:spPr>
+        <p:txBody>
+          <a:bodyPr vert="horz" lIns="91440" tIns="45720" rIns="91440" bIns="45720" rtlCol="0">
+            <a:normAutofit/>
+          </a:bodyPr>
+          <a:lstStyle>
+            <a:lvl1pPr marL="45720" indent="0">
+              <a:buNone/>
+              <a:defRPr sz="1800"/>
+            </a:lvl1pPr>
+          </a:lstStyle>
+          <a:p>
+            <a:pPr lvl="0"/>
+            <a:endParaRPr lang="en-US" dirty="0"/>
           </a:p>
         </p:txBody>
       </p:sp>
     </p:spTree>
     <p:extLst>
       <p:ext uri="{BB962C8B-B14F-4D97-AF65-F5344CB8AC3E}">
-        <p14:creationId xmlns:p14="http://schemas.microsoft.com/office/powerpoint/2010/main" val="338346009"/>
+        <p14:creationId xmlns:p14="http://schemas.microsoft.com/office/powerpoint/2010/main" val="4163851231"/>
       </p:ext>
     </p:extLst>
   </p:cSld>
@@ -917,23 +965,28 @@
         </p:nvSpPr>
         <p:spPr>
           <a:xfrm>
-            <a:off x="722313" y="4406900"/>
-            <a:ext cx="7772400" cy="1362075"/>
+            <a:off x="1106424" y="1173575"/>
+            <a:ext cx="9966960" cy="2926080"/>
           </a:xfrm>
         </p:spPr>
         <p:txBody>
-          <a:bodyPr anchor="t"/>
+          <a:bodyPr anchor="b">
+            <a:noAutofit/>
+          </a:bodyPr>
           <a:lstStyle>
-            <a:lvl1pPr algn="l">
-              <a:defRPr sz="4000" b="1" cap="all"/>
+            <a:lvl1pPr algn="ctr">
+              <a:lnSpc>
+                <a:spcPct val="85000"/>
+              </a:lnSpc>
+              <a:defRPr sz="7200" b="0" cap="all" baseline="0"/>
             </a:lvl1pPr>
           </a:lstStyle>
           <a:p>
             <a:r>
-              <a:rPr lang="en-US" smtClean="0"/>
+              <a:rPr lang="en-US"/>
               <a:t>Click to edit Master title style</a:t>
             </a:r>
-            <a:endParaRPr lang="en-US"/>
+            <a:endParaRPr lang="en-US" dirty="0"/>
           </a:p>
         </p:txBody>
       </p:sp>
@@ -949,20 +1002,20 @@
         </p:nvSpPr>
         <p:spPr>
           <a:xfrm>
-            <a:off x="722313" y="2906713"/>
-            <a:ext cx="7772400" cy="1500187"/>
+            <a:off x="1709928" y="4154520"/>
+            <a:ext cx="8769096" cy="1363806"/>
           </a:xfrm>
         </p:spPr>
         <p:txBody>
-          <a:bodyPr anchor="b"/>
+          <a:bodyPr anchor="t">
+            <a:normAutofit/>
+          </a:bodyPr>
           <a:lstStyle>
-            <a:lvl1pPr marL="0" indent="0">
-              <a:buNone/>
-              <a:defRPr sz="2000">
+            <a:lvl1pPr marL="0" indent="0" algn="ctr">
+              <a:buNone/>
+              <a:defRPr sz="2200">
                 <a:solidFill>
-                  <a:schemeClr val="tx1">
-                    <a:tint val="75000"/>
-                  </a:schemeClr>
+                  <a:schemeClr val="accent1"/>
                 </a:solidFill>
               </a:defRPr>
             </a:lvl1pPr>
@@ -1050,7 +1103,7 @@
           <a:p>
             <a:pPr lvl="0"/>
             <a:r>
-              <a:rPr lang="en-US" smtClean="0"/>
+              <a:rPr lang="en-US"/>
               <a:t>Click to edit Master text styles</a:t>
             </a:r>
           </a:p>
@@ -1071,11 +1124,11 @@
           <a:bodyPr/>
           <a:lstStyle/>
           <a:p>
-            <a:fld id="{241EB5C9-1307-BA42-ABA2-0BC069CD8E7F}" type="datetimeFigureOut">
-              <a:rPr lang="en-US" smtClean="0"/>
-              <a:t>2/17/2018</a:t>
+            <a:fld id="{96DFF08F-DC6B-4601-B491-B0F83F6DD2DA}" type="datetimeFigureOut">
+              <a:rPr lang="en-US" dirty="0"/>
+              <a:t>3/31/2019</a:t>
             </a:fld>
-            <a:endParaRPr lang="en-US"/>
+            <a:endParaRPr lang="en-US" dirty="0"/>
           </a:p>
         </p:txBody>
       </p:sp>
@@ -1094,7 +1147,7 @@
           <a:bodyPr/>
           <a:lstStyle/>
           <a:p>
-            <a:endParaRPr lang="en-US"/>
+            <a:endParaRPr lang="en-US" dirty="0"/>
           </a:p>
         </p:txBody>
       </p:sp>
@@ -1113,18 +1166,53 @@
           <a:bodyPr/>
           <a:lstStyle/>
           <a:p>
-            <a:fld id="{C5EF2332-01BF-834F-8236-50238282D533}" type="slidenum">
-              <a:rPr lang="en-US" smtClean="0"/>
+            <a:fld id="{4FAB73BC-B049-4115-A692-8D63A059BFB8}" type="slidenum">
+              <a:rPr lang="en-US" dirty="0"/>
               <a:t>‹#›</a:t>
             </a:fld>
-            <a:endParaRPr lang="en-US"/>
-          </a:p>
-        </p:txBody>
-      </p:sp>
+            <a:endParaRPr lang="en-US" dirty="0"/>
+          </a:p>
+        </p:txBody>
+      </p:sp>
+      <p:cxnSp>
+        <p:nvCxnSpPr>
+          <p:cNvPr id="7" name="Straight Connector 6"/>
+          <p:cNvCxnSpPr/>
+          <p:nvPr/>
+        </p:nvCxnSpPr>
+        <p:spPr>
+          <a:xfrm>
+            <a:off x="1981200" y="4020408"/>
+            <a:ext cx="8229601" cy="0"/>
+          </a:xfrm>
+          <a:prstGeom prst="line">
+            <a:avLst/>
+          </a:prstGeom>
+          <a:ln>
+            <a:solidFill>
+              <a:schemeClr val="accent1"/>
+            </a:solidFill>
+          </a:ln>
+        </p:spPr>
+        <p:style>
+          <a:lnRef idx="1">
+            <a:schemeClr val="accent1"/>
+          </a:lnRef>
+          <a:fillRef idx="0">
+            <a:schemeClr val="accent1"/>
+          </a:fillRef>
+          <a:effectRef idx="0">
+            <a:schemeClr val="accent1"/>
+          </a:effectRef>
+          <a:fontRef idx="minor">
+            <a:schemeClr val="tx1"/>
+          </a:fontRef>
+        </p:style>
+      </p:cxnSp>
     </p:spTree>
     <p:extLst>
       <p:ext uri="{BB962C8B-B14F-4D97-AF65-F5344CB8AC3E}">
-        <p14:creationId xmlns:p14="http://schemas.microsoft.com/office/powerpoint/2010/main" val="1073069076"/>
+        <p14:creationId xmlns:p14="http://schemas.microsoft.com/office/powerpoint/2010/main" val="2623353940"/>
       </p:ext>
     </p:extLst>
   </p:cSld>
@@ -1153,7 +1241,7 @@
       </p:grpSpPr>
       <p:sp>
         <p:nvSpPr>
-          <p:cNvPr id="2" name="Title 1"/>
+          <p:cNvPr id="8" name="Title 7"/>
           <p:cNvSpPr>
             <a:spLocks noGrp="1"/>
           </p:cNvSpPr>
@@ -1167,10 +1255,10 @@
           <a:lstStyle/>
           <a:p>
             <a:r>
-              <a:rPr lang="en-US" smtClean="0"/>
+              <a:rPr lang="en-US"/>
               <a:t>Click to edit Master title style</a:t>
             </a:r>
-            <a:endParaRPr lang="en-US"/>
+            <a:endParaRPr lang="en-US" dirty="0"/>
           </a:p>
         </p:txBody>
       </p:sp>
@@ -1186,76 +1274,76 @@
         </p:nvSpPr>
         <p:spPr>
           <a:xfrm>
-            <a:off x="457200" y="1600200"/>
-            <a:ext cx="4038600" cy="4525963"/>
+            <a:off x="1143000" y="2057399"/>
+            <a:ext cx="4754880" cy="4023360"/>
           </a:xfrm>
         </p:spPr>
         <p:txBody>
           <a:bodyPr/>
           <a:lstStyle>
             <a:lvl1pPr>
-              <a:defRPr sz="2800"/>
+              <a:defRPr sz="2200"/>
             </a:lvl1pPr>
             <a:lvl2pPr>
-              <a:defRPr sz="2400"/>
+              <a:defRPr sz="2000"/>
             </a:lvl2pPr>
             <a:lvl3pPr>
-              <a:defRPr sz="2000"/>
+              <a:defRPr sz="1800"/>
             </a:lvl3pPr>
             <a:lvl4pPr>
-              <a:defRPr sz="1800"/>
+              <a:defRPr sz="1600"/>
             </a:lvl4pPr>
             <a:lvl5pPr>
-              <a:defRPr sz="1800"/>
+              <a:defRPr sz="1600"/>
             </a:lvl5pPr>
             <a:lvl6pPr>
-              <a:defRPr sz="1800"/>
+              <a:defRPr sz="1600"/>
             </a:lvl6pPr>
             <a:lvl7pPr>
-              <a:defRPr sz="1800"/>
+              <a:defRPr sz="1600"/>
             </a:lvl7pPr>
             <a:lvl8pPr>
-              <a:defRPr sz="1800"/>
+              <a:defRPr sz="1600"/>
             </a:lvl8pPr>
             <a:lvl9pPr>
-              <a:defRPr sz="1800"/>
+              <a:defRPr sz="1600"/>
             </a:lvl9pPr>
           </a:lstStyle>
           <a:p>
             <a:pPr lvl="0"/>
             <a:r>
-              <a:rPr lang="en-US" smtClean="0"/>
+              <a:rPr lang="en-US"/>
               <a:t>Click to edit Master text styles</a:t>
             </a:r>
           </a:p>
           <a:p>
             <a:pPr lvl="1"/>
             <a:r>
-              <a:rPr lang="en-US" smtClean="0"/>
+              <a:rPr lang="en-US"/>
               <a:t>Second level</a:t>
             </a:r>
           </a:p>
           <a:p>
             <a:pPr lvl="2"/>
             <a:r>
-              <a:rPr lang="en-US" smtClean="0"/>
+              <a:rPr lang="en-US"/>
               <a:t>Third level</a:t>
             </a:r>
           </a:p>
           <a:p>
             <a:pPr lvl="3"/>
             <a:r>
-              <a:rPr lang="en-US" smtClean="0"/>
+              <a:rPr lang="en-US"/>
               <a:t>Fourth level</a:t>
             </a:r>
           </a:p>
           <a:p>
             <a:pPr lvl="4"/>
             <a:r>
-              <a:rPr lang="en-US" smtClean="0"/>
+              <a:rPr lang="en-US"/>
               <a:t>Fifth level</a:t>
             </a:r>
-            <a:endParaRPr lang="en-US"/>
+            <a:endParaRPr lang="en-US" dirty="0"/>
           </a:p>
         </p:txBody>
       </p:sp>
@@ -1271,76 +1359,75 @@
         </p:nvSpPr>
         <p:spPr>
           <a:xfrm>
-            <a:off x="4648200" y="1600200"/>
-            <a:ext cx="4038600" cy="4525963"/>
+            <a:off x="6267612" y="2057400"/>
+            <a:ext cx="4754880" cy="4023360"/>
           </a:xfrm>
         </p:spPr>
         <p:txBody>
           <a:bodyPr/>
           <a:lstStyle>
             <a:lvl1pPr>
-              <a:defRPr sz="2800"/>
+              <a:defRPr sz="2200"/>
             </a:lvl1pPr>
             <a:lvl2pPr>
-              <a:defRPr sz="2400"/>
+              <a:defRPr sz="2000"/>
             </a:lvl2pPr>
             <a:lvl3pPr>
-              <a:defRPr sz="2000"/>
+              <a:defRPr sz="1800"/>
             </a:lvl3pPr>
             <a:lvl4pPr>
-              <a:defRPr sz="1800"/>
+              <a:defRPr sz="1600"/>
             </a:lvl4pPr>
             <a:lvl5pPr>
-              <a:defRPr sz="1800"/>
+              <a:defRPr sz="1600"/>
             </a:lvl5pPr>
             <a:lvl6pPr>
-              <a:defRPr sz="1800"/>
+              <a:defRPr sz="1600"/>
             </a:lvl6pPr>
             <a:lvl7pPr>
-              <a:defRPr sz="1800"/>
+              <a:defRPr sz="1600"/>
             </a:lvl7pPr>
             <a:lvl8pPr>
-              <a:defRPr sz="1800"/>
+              <a:defRPr sz="1600"/>
             </a:lvl8pPr>
             <a:lvl9pPr>
-              <a:defRPr sz="1800"/>
+              <a:defRPr sz="1600"/>
             </a:lvl9pPr>
           </a:lstStyle>
           <a:p>
             <a:pPr lvl="0"/>
             <a:r>
-              <a:rPr lang="en-US" smtClean="0"/>
+              <a:rPr lang="en-US" dirty="0"/>
               <a:t>Click to edit Master text styles</a:t>
             </a:r>
           </a:p>
           <a:p>
             <a:pPr lvl="1"/>
             <a:r>
-              <a:rPr lang="en-US" smtClean="0"/>
+              <a:rPr lang="en-US" dirty="0"/>
               <a:t>Second level</a:t>
             </a:r>
           </a:p>
           <a:p>
             <a:pPr lvl="2"/>
             <a:r>
-              <a:rPr lang="en-US" smtClean="0"/>
+              <a:rPr lang="en-US" dirty="0"/>
               <a:t>Third level</a:t>
             </a:r>
           </a:p>
           <a:p>
             <a:pPr lvl="3"/>
             <a:r>
-              <a:rPr lang="en-US" smtClean="0"/>
+              <a:rPr lang="en-US" dirty="0"/>
               <a:t>Fourth level</a:t>
             </a:r>
           </a:p>
           <a:p>
             <a:pPr lvl="4"/>
             <a:r>
-              <a:rPr lang="en-US" smtClean="0"/>
+              <a:rPr lang="en-US" dirty="0"/>
               <a:t>Fifth level</a:t>
             </a:r>
-            <a:endParaRPr lang="en-US"/>
           </a:p>
         </p:txBody>
       </p:sp>
@@ -1359,11 +1446,11 @@
           <a:bodyPr/>
           <a:lstStyle/>
           <a:p>
-            <a:fld id="{241EB5C9-1307-BA42-ABA2-0BC069CD8E7F}" type="datetimeFigureOut">
-              <a:rPr lang="en-US" smtClean="0"/>
-              <a:t>2/17/2018</a:t>
+            <a:fld id="{96DFF08F-DC6B-4601-B491-B0F83F6DD2DA}" type="datetimeFigureOut">
+              <a:rPr lang="en-US" dirty="0"/>
+              <a:t>3/31/2019</a:t>
             </a:fld>
-            <a:endParaRPr lang="en-US"/>
+            <a:endParaRPr lang="en-US" dirty="0"/>
           </a:p>
         </p:txBody>
       </p:sp>
@@ -1382,7 +1469,7 @@
           <a:bodyPr/>
           <a:lstStyle/>
           <a:p>
-            <a:endParaRPr lang="en-US"/>
+            <a:endParaRPr lang="en-US" dirty="0"/>
           </a:p>
         </p:txBody>
       </p:sp>
@@ -1401,18 +1488,18 @@
           <a:bodyPr/>
           <a:lstStyle/>
           <a:p>
-            <a:fld id="{C5EF2332-01BF-834F-8236-50238282D533}" type="slidenum">
-              <a:rPr lang="en-US" smtClean="0"/>
+            <a:fld id="{4FAB73BC-B049-4115-A692-8D63A059BFB8}" type="slidenum">
+              <a:rPr lang="en-US" dirty="0"/>
               <a:t>‹#›</a:t>
             </a:fld>
-            <a:endParaRPr lang="en-US"/>
+            <a:endParaRPr lang="en-US" dirty="0"/>
           </a:p>
         </p:txBody>
       </p:sp>
     </p:spTree>
     <p:extLst>
       <p:ext uri="{BB962C8B-B14F-4D97-AF65-F5344CB8AC3E}">
-        <p14:creationId xmlns:p14="http://schemas.microsoft.com/office/powerpoint/2010/main" val="2619886245"/>
+        <p14:creationId xmlns:p14="http://schemas.microsoft.com/office/powerpoint/2010/main" val="2544554290"/>
       </p:ext>
     </p:extLst>
   </p:cSld>
@@ -1441,7 +1528,7 @@
       </p:grpSpPr>
       <p:sp>
         <p:nvSpPr>
-          <p:cNvPr id="2" name="Title 1"/>
+          <p:cNvPr id="10" name="Title 9"/>
           <p:cNvSpPr>
             <a:spLocks noGrp="1"/>
           </p:cNvSpPr>
@@ -1452,17 +1539,13 @@
         <p:spPr/>
         <p:txBody>
           <a:bodyPr/>
-          <a:lstStyle>
-            <a:lvl1pPr>
-              <a:defRPr/>
-            </a:lvl1pPr>
-          </a:lstStyle>
-          <a:p>
-            <a:r>
-              <a:rPr lang="en-US" smtClean="0"/>
+          <a:lstStyle/>
+          <a:p>
+            <a:r>
+              <a:rPr lang="en-US"/>
               <a:t>Click to edit Master title style</a:t>
             </a:r>
-            <a:endParaRPr lang="en-US"/>
+            <a:endParaRPr lang="en-US" dirty="0"/>
           </a:p>
         </p:txBody>
       </p:sp>
@@ -1478,14 +1561,17 @@
         </p:nvSpPr>
         <p:spPr>
           <a:xfrm>
-            <a:off x="457200" y="1535113"/>
-            <a:ext cx="4040188" cy="639762"/>
+            <a:off x="1143000" y="2001511"/>
+            <a:ext cx="4754880" cy="777240"/>
           </a:xfrm>
         </p:spPr>
         <p:txBody>
-          <a:bodyPr anchor="b"/>
+          <a:bodyPr anchor="ctr"/>
           <a:lstStyle>
             <a:lvl1pPr marL="0" indent="0">
+              <a:spcBef>
+                <a:spcPts val="0"/>
+              </a:spcBef>
               <a:buNone/>
               <a:defRPr sz="2400" b="1"/>
             </a:lvl1pPr>
@@ -1525,7 +1611,7 @@
           <a:p>
             <a:pPr lvl="0"/>
             <a:r>
-              <a:rPr lang="en-US" smtClean="0"/>
+              <a:rPr lang="en-US"/>
               <a:t>Click to edit Master text styles</a:t>
             </a:r>
           </a:p>
@@ -1543,15 +1629,15 @@
         </p:nvSpPr>
         <p:spPr>
           <a:xfrm>
-            <a:off x="457200" y="2174875"/>
-            <a:ext cx="4040188" cy="3951288"/>
+            <a:off x="1143000" y="2721483"/>
+            <a:ext cx="4754880" cy="3383280"/>
           </a:xfrm>
         </p:spPr>
         <p:txBody>
           <a:bodyPr/>
           <a:lstStyle>
             <a:lvl1pPr>
-              <a:defRPr sz="2400"/>
+              <a:defRPr sz="2200"/>
             </a:lvl1pPr>
             <a:lvl2pPr>
               <a:defRPr sz="2000"/>
@@ -1581,38 +1667,38 @@
           <a:p>
             <a:pPr lvl="0"/>
             <a:r>
-              <a:rPr lang="en-US" smtClean="0"/>
+              <a:rPr lang="en-US"/>
               <a:t>Click to edit Master text styles</a:t>
             </a:r>
           </a:p>
           <a:p>
             <a:pPr lvl="1"/>
             <a:r>
-              <a:rPr lang="en-US" smtClean="0"/>
+              <a:rPr lang="en-US"/>
               <a:t>Second level</a:t>
             </a:r>
           </a:p>
           <a:p>
             <a:pPr lvl="2"/>
             <a:r>
-              <a:rPr lang="en-US" smtClean="0"/>
+              <a:rPr lang="en-US"/>
               <a:t>Third level</a:t>
             </a:r>
           </a:p>
           <a:p>
             <a:pPr lvl="3"/>
             <a:r>
-              <a:rPr lang="en-US" smtClean="0"/>
+              <a:rPr lang="en-US"/>
               <a:t>Fourth level</a:t>
             </a:r>
           </a:p>
           <a:p>
             <a:pPr lvl="4"/>
             <a:r>
-              <a:rPr lang="en-US" smtClean="0"/>
+              <a:rPr lang="en-US"/>
               <a:t>Fifth level</a:t>
             </a:r>
-            <a:endParaRPr lang="en-US"/>
+            <a:endParaRPr lang="en-US" dirty="0"/>
           </a:p>
         </p:txBody>
       </p:sp>
@@ -1628,14 +1714,17 @@
         </p:nvSpPr>
         <p:spPr>
           <a:xfrm>
-            <a:off x="4645025" y="1535113"/>
-            <a:ext cx="4041775" cy="639762"/>
+            <a:off x="6269173" y="1999032"/>
+            <a:ext cx="4754880" cy="777240"/>
           </a:xfrm>
         </p:spPr>
         <p:txBody>
-          <a:bodyPr anchor="b"/>
+          <a:bodyPr anchor="ctr"/>
           <a:lstStyle>
             <a:lvl1pPr marL="0" indent="0">
+              <a:spcBef>
+                <a:spcPts val="0"/>
+              </a:spcBef>
               <a:buNone/>
               <a:defRPr sz="2400" b="1"/>
             </a:lvl1pPr>
@@ -1675,7 +1764,7 @@
           <a:p>
             <a:pPr lvl="0"/>
             <a:r>
-              <a:rPr lang="en-US" smtClean="0"/>
+              <a:rPr lang="en-US"/>
               <a:t>Click to edit Master text styles</a:t>
             </a:r>
           </a:p>
@@ -1693,15 +1782,15 @@
         </p:nvSpPr>
         <p:spPr>
           <a:xfrm>
-            <a:off x="4645025" y="2174875"/>
-            <a:ext cx="4041775" cy="3951288"/>
+            <a:off x="6269173" y="2719322"/>
+            <a:ext cx="4754880" cy="3383280"/>
           </a:xfrm>
         </p:spPr>
         <p:txBody>
           <a:bodyPr/>
           <a:lstStyle>
             <a:lvl1pPr>
-              <a:defRPr sz="2400"/>
+              <a:defRPr sz="2200"/>
             </a:lvl1pPr>
             <a:lvl2pPr>
               <a:defRPr sz="2000"/>
@@ -1731,38 +1820,38 @@
           <a:p>
             <a:pPr lvl="0"/>
             <a:r>
-              <a:rPr lang="en-US" smtClean="0"/>
+              <a:rPr lang="en-US"/>
               <a:t>Click to edit Master text styles</a:t>
             </a:r>
           </a:p>
           <a:p>
             <a:pPr lvl="1"/>
             <a:r>
-              <a:rPr lang="en-US" smtClean="0"/>
+              <a:rPr lang="en-US"/>
               <a:t>Second level</a:t>
             </a:r>
           </a:p>
           <a:p>
             <a:pPr lvl="2"/>
             <a:r>
-              <a:rPr lang="en-US" smtClean="0"/>
+              <a:rPr lang="en-US"/>
               <a:t>Third level</a:t>
             </a:r>
           </a:p>
           <a:p>
             <a:pPr lvl="3"/>
             <a:r>
-              <a:rPr lang="en-US" smtClean="0"/>
+              <a:rPr lang="en-US"/>
               <a:t>Fourth level</a:t>
             </a:r>
           </a:p>
           <a:p>
             <a:pPr lvl="4"/>
             <a:r>
-              <a:rPr lang="en-US" smtClean="0"/>
+              <a:rPr lang="en-US"/>
               <a:t>Fifth level</a:t>
             </a:r>
-            <a:endParaRPr lang="en-US"/>
+            <a:endParaRPr lang="en-US" dirty="0"/>
           </a:p>
         </p:txBody>
       </p:sp>
@@ -1781,11 +1870,11 @@
           <a:bodyPr/>
           <a:lstStyle/>
           <a:p>
-            <a:fld id="{241EB5C9-1307-BA42-ABA2-0BC069CD8E7F}" type="datetimeFigureOut">
-              <a:rPr lang="en-US" smtClean="0"/>
-              <a:t>2/17/2018</a:t>
+            <a:fld id="{96DFF08F-DC6B-4601-B491-B0F83F6DD2DA}" type="datetimeFigureOut">
+              <a:rPr lang="en-US" dirty="0"/>
+              <a:t>3/31/2019</a:t>
             </a:fld>
-            <a:endParaRPr lang="en-US"/>
+            <a:endParaRPr lang="en-US" dirty="0"/>
           </a:p>
         </p:txBody>
       </p:sp>
@@ -1804,7 +1893,7 @@
           <a:bodyPr/>
           <a:lstStyle/>
           <a:p>
-            <a:endParaRPr lang="en-US"/>
+            <a:endParaRPr lang="en-US" dirty="0"/>
           </a:p>
         </p:txBody>
       </p:sp>
@@ -1823,18 +1912,18 @@
           <a:bodyPr/>
           <a:lstStyle/>
           <a:p>
-            <a:fld id="{C5EF2332-01BF-834F-8236-50238282D533}" type="slidenum">
-              <a:rPr lang="en-US" smtClean="0"/>
+            <a:fld id="{4FAB73BC-B049-4115-A692-8D63A059BFB8}" type="slidenum">
+              <a:rPr lang="en-US" dirty="0"/>
               <a:t>‹#›</a:t>
             </a:fld>
-            <a:endParaRPr lang="en-US"/>
+            <a:endParaRPr lang="en-US" dirty="0"/>
           </a:p>
         </p:txBody>
       </p:sp>
     </p:spTree>
     <p:extLst>
       <p:ext uri="{BB962C8B-B14F-4D97-AF65-F5344CB8AC3E}">
-        <p14:creationId xmlns:p14="http://schemas.microsoft.com/office/powerpoint/2010/main" val="2535793967"/>
+        <p14:creationId xmlns:p14="http://schemas.microsoft.com/office/powerpoint/2010/main" val="1170095705"/>
       </p:ext>
     </p:extLst>
   </p:cSld>
@@ -1877,10 +1966,10 @@
           <a:lstStyle/>
           <a:p>
             <a:r>
-              <a:rPr lang="en-US" smtClean="0"/>
+              <a:rPr lang="en-US"/>
               <a:t>Click to edit Master title style</a:t>
             </a:r>
-            <a:endParaRPr lang="en-US"/>
+            <a:endParaRPr lang="en-US" dirty="0"/>
           </a:p>
         </p:txBody>
       </p:sp>
@@ -1899,11 +1988,11 @@
           <a:bodyPr/>
           <a:lstStyle/>
           <a:p>
-            <a:fld id="{241EB5C9-1307-BA42-ABA2-0BC069CD8E7F}" type="datetimeFigureOut">
-              <a:rPr lang="en-US" smtClean="0"/>
-              <a:t>2/17/2018</a:t>
+            <a:fld id="{96DFF08F-DC6B-4601-B491-B0F83F6DD2DA}" type="datetimeFigureOut">
+              <a:rPr lang="en-US" dirty="0"/>
+              <a:t>3/31/2019</a:t>
             </a:fld>
-            <a:endParaRPr lang="en-US"/>
+            <a:endParaRPr lang="en-US" dirty="0"/>
           </a:p>
         </p:txBody>
       </p:sp>
@@ -1922,7 +2011,7 @@
           <a:bodyPr/>
           <a:lstStyle/>
           <a:p>
-            <a:endParaRPr lang="en-US"/>
+            <a:endParaRPr lang="en-US" dirty="0"/>
           </a:p>
         </p:txBody>
       </p:sp>
@@ -1941,18 +2030,18 @@
           <a:bodyPr/>
           <a:lstStyle/>
           <a:p>
-            <a:fld id="{C5EF2332-01BF-834F-8236-50238282D533}" type="slidenum">
-              <a:rPr lang="en-US" smtClean="0"/>
+            <a:fld id="{4FAB73BC-B049-4115-A692-8D63A059BFB8}" type="slidenum">
+              <a:rPr lang="en-US" dirty="0"/>
               <a:t>‹#›</a:t>
             </a:fld>
-            <a:endParaRPr lang="en-US"/>
+            <a:endParaRPr lang="en-US" dirty="0"/>
           </a:p>
         </p:txBody>
       </p:sp>
     </p:spTree>
     <p:extLst>
       <p:ext uri="{BB962C8B-B14F-4D97-AF65-F5344CB8AC3E}">
-        <p14:creationId xmlns:p14="http://schemas.microsoft.com/office/powerpoint/2010/main" val="3472721253"/>
+        <p14:creationId xmlns:p14="http://schemas.microsoft.com/office/powerpoint/2010/main" val="3311691841"/>
       </p:ext>
     </p:extLst>
   </p:cSld>
@@ -1994,11 +2083,11 @@
           <a:bodyPr/>
           <a:lstStyle/>
           <a:p>
-            <a:fld id="{241EB5C9-1307-BA42-ABA2-0BC069CD8E7F}" type="datetimeFigureOut">
-              <a:rPr lang="en-US" smtClean="0"/>
-              <a:t>2/17/2018</a:t>
+            <a:fld id="{96DFF08F-DC6B-4601-B491-B0F83F6DD2DA}" type="datetimeFigureOut">
+              <a:rPr lang="en-US" dirty="0"/>
+              <a:t>3/31/2019</a:t>
             </a:fld>
-            <a:endParaRPr lang="en-US"/>
+            <a:endParaRPr lang="en-US" dirty="0"/>
           </a:p>
         </p:txBody>
       </p:sp>
@@ -2017,7 +2106,7 @@
           <a:bodyPr/>
           <a:lstStyle/>
           <a:p>
-            <a:endParaRPr lang="en-US"/>
+            <a:endParaRPr lang="en-US" dirty="0"/>
           </a:p>
         </p:txBody>
       </p:sp>
@@ -2036,18 +2125,18 @@
           <a:bodyPr/>
           <a:lstStyle/>
           <a:p>
-            <a:fld id="{C5EF2332-01BF-834F-8236-50238282D533}" type="slidenum">
-              <a:rPr lang="en-US" smtClean="0"/>
+            <a:fld id="{4FAB73BC-B049-4115-A692-8D63A059BFB8}" type="slidenum">
+              <a:rPr lang="en-US" dirty="0"/>
               <a:t>‹#›</a:t>
             </a:fld>
-            <a:endParaRPr lang="en-US"/>
+            <a:endParaRPr lang="en-US" dirty="0"/>
           </a:p>
         </p:txBody>
       </p:sp>
     </p:spTree>
     <p:extLst>
       <p:ext uri="{BB962C8B-B14F-4D97-AF65-F5344CB8AC3E}">
-        <p14:creationId xmlns:p14="http://schemas.microsoft.com/office/powerpoint/2010/main" val="2130901097"/>
+        <p14:creationId xmlns:p14="http://schemas.microsoft.com/office/powerpoint/2010/main" val="4106206164"/>
       </p:ext>
     </p:extLst>
   </p:cSld>
@@ -2086,23 +2175,28 @@
         </p:nvSpPr>
         <p:spPr>
           <a:xfrm>
-            <a:off x="457200" y="273050"/>
-            <a:ext cx="3008313" cy="1162050"/>
+            <a:off x="1143000" y="1097280"/>
+            <a:ext cx="3931920" cy="1737360"/>
           </a:xfrm>
         </p:spPr>
         <p:txBody>
-          <a:bodyPr anchor="b"/>
+          <a:bodyPr anchor="b">
+            <a:noAutofit/>
+          </a:bodyPr>
           <a:lstStyle>
-            <a:lvl1pPr algn="l">
-              <a:defRPr sz="2000" b="1"/>
+            <a:lvl1pPr>
+              <a:lnSpc>
+                <a:spcPct val="90000"/>
+              </a:lnSpc>
+              <a:defRPr sz="4000" b="0"/>
             </a:lvl1pPr>
           </a:lstStyle>
           <a:p>
             <a:r>
-              <a:rPr lang="en-US" smtClean="0"/>
+              <a:rPr lang="en-US"/>
               <a:t>Click to edit Master title style</a:t>
             </a:r>
-            <a:endParaRPr lang="en-US"/>
+            <a:endParaRPr lang="en-US" dirty="0"/>
           </a:p>
         </p:txBody>
       </p:sp>
@@ -2118,8 +2212,8 @@
         </p:nvSpPr>
         <p:spPr>
           <a:xfrm>
-            <a:off x="3575050" y="273050"/>
-            <a:ext cx="5111750" cy="5853113"/>
+            <a:off x="5852159" y="1097280"/>
+            <a:ext cx="5212080" cy="4663440"/>
           </a:xfrm>
         </p:spPr>
         <p:txBody>
@@ -2156,38 +2250,38 @@
           <a:p>
             <a:pPr lvl="0"/>
             <a:r>
-              <a:rPr lang="en-US" smtClean="0"/>
+              <a:rPr lang="en-US"/>
               <a:t>Click to edit Master text styles</a:t>
             </a:r>
           </a:p>
           <a:p>
             <a:pPr lvl="1"/>
             <a:r>
-              <a:rPr lang="en-US" smtClean="0"/>
+              <a:rPr lang="en-US"/>
               <a:t>Second level</a:t>
             </a:r>
           </a:p>
           <a:p>
             <a:pPr lvl="2"/>
             <a:r>
-              <a:rPr lang="en-US" smtClean="0"/>
+              <a:rPr lang="en-US"/>
               <a:t>Third level</a:t>
             </a:r>
           </a:p>
           <a:p>
             <a:pPr lvl="3"/>
             <a:r>
-              <a:rPr lang="en-US" smtClean="0"/>
+              <a:rPr lang="en-US"/>
               <a:t>Fourth level</a:t>
             </a:r>
           </a:p>
           <a:p>
             <a:pPr lvl="4"/>
             <a:r>
-              <a:rPr lang="en-US" smtClean="0"/>
+              <a:rPr lang="en-US"/>
               <a:t>Fifth level</a:t>
             </a:r>
-            <a:endParaRPr lang="en-US"/>
+            <a:endParaRPr lang="en-US" dirty="0"/>
           </a:p>
         </p:txBody>
       </p:sp>
@@ -2203,16 +2297,24 @@
         </p:nvSpPr>
         <p:spPr>
           <a:xfrm>
-            <a:off x="457200" y="1435100"/>
-            <a:ext cx="3008313" cy="4691063"/>
+            <a:off x="1143000" y="2834640"/>
+            <a:ext cx="3931920" cy="3017520"/>
           </a:xfrm>
         </p:spPr>
         <p:txBody>
-          <a:bodyPr/>
+          <a:bodyPr>
+            <a:normAutofit/>
+          </a:bodyPr>
           <a:lstStyle>
             <a:lvl1pPr marL="0" indent="0">
-              <a:buNone/>
-              <a:defRPr sz="1400"/>
+              <a:lnSpc>
+                <a:spcPct val="100000"/>
+              </a:lnSpc>
+              <a:spcBef>
+                <a:spcPts val="1000"/>
+              </a:spcBef>
+              <a:buNone/>
+              <a:defRPr sz="1700"/>
             </a:lvl1pPr>
             <a:lvl2pPr marL="457200" indent="0">
               <a:buNone/>
@@ -2250,7 +2352,7 @@
           <a:p>
             <a:pPr lvl="0"/>
             <a:r>
-              <a:rPr lang="en-US" smtClean="0"/>
+              <a:rPr lang="en-US"/>
               <a:t>Click to edit Master text styles</a:t>
             </a:r>
           </a:p>
@@ -2271,11 +2373,11 @@
           <a:bodyPr/>
           <a:lstStyle/>
           <a:p>
-            <a:fld id="{241EB5C9-1307-BA42-ABA2-0BC069CD8E7F}" type="datetimeFigureOut">
-              <a:rPr lang="en-US" smtClean="0"/>
-              <a:t>2/17/2018</a:t>
+            <a:fld id="{96DFF08F-DC6B-4601-B491-B0F83F6DD2DA}" type="datetimeFigureOut">
+              <a:rPr lang="en-US" dirty="0"/>
+              <a:t>3/31/2019</a:t>
             </a:fld>
-            <a:endParaRPr lang="en-US"/>
+            <a:endParaRPr lang="en-US" dirty="0"/>
           </a:p>
         </p:txBody>
       </p:sp>
@@ -2294,7 +2396,7 @@
           <a:bodyPr/>
           <a:lstStyle/>
           <a:p>
-            <a:endParaRPr lang="en-US"/>
+            <a:endParaRPr lang="en-US" dirty="0"/>
           </a:p>
         </p:txBody>
       </p:sp>
@@ -2313,18 +2415,18 @@
           <a:bodyPr/>
           <a:lstStyle/>
           <a:p>
-            <a:fld id="{C5EF2332-01BF-834F-8236-50238282D533}" type="slidenum">
-              <a:rPr lang="en-US" smtClean="0"/>
+            <a:fld id="{4FAB73BC-B049-4115-A692-8D63A059BFB8}" type="slidenum">
+              <a:rPr lang="en-US" dirty="0"/>
               <a:t>‹#›</a:t>
             </a:fld>
-            <a:endParaRPr lang="en-US"/>
+            <a:endParaRPr lang="en-US" dirty="0"/>
           </a:p>
         </p:txBody>
       </p:sp>
     </p:spTree>
     <p:extLst>
       <p:ext uri="{BB962C8B-B14F-4D97-AF65-F5344CB8AC3E}">
-        <p14:creationId xmlns:p14="http://schemas.microsoft.com/office/powerpoint/2010/main" val="3540895647"/>
+        <p14:creationId xmlns:p14="http://schemas.microsoft.com/office/powerpoint/2010/main" val="3912168708"/>
       </p:ext>
     </p:extLst>
   </p:cSld>
@@ -2363,23 +2465,28 @@
         </p:nvSpPr>
         <p:spPr>
           <a:xfrm>
-            <a:off x="1792288" y="4800600"/>
-            <a:ext cx="5486400" cy="566738"/>
+            <a:off x="1143000" y="1097280"/>
+            <a:ext cx="3931920" cy="1737360"/>
           </a:xfrm>
         </p:spPr>
         <p:txBody>
-          <a:bodyPr anchor="b"/>
+          <a:bodyPr anchor="b">
+            <a:noAutofit/>
+          </a:bodyPr>
           <a:lstStyle>
-            <a:lvl1pPr algn="l">
-              <a:defRPr sz="2000" b="1"/>
+            <a:lvl1pPr>
+              <a:lnSpc>
+                <a:spcPct val="90000"/>
+              </a:lnSpc>
+              <a:defRPr sz="4000" b="0"/>
             </a:lvl1pPr>
           </a:lstStyle>
           <a:p>
             <a:r>
-              <a:rPr lang="en-US" smtClean="0"/>
+              <a:rPr lang="en-US"/>
               <a:t>Click to edit Master title style</a:t>
             </a:r>
-            <a:endParaRPr lang="en-US"/>
+            <a:endParaRPr lang="en-US" dirty="0"/>
           </a:p>
         </p:txBody>
       </p:sp>
@@ -2387,7 +2494,7 @@
         <p:nvSpPr>
           <p:cNvPr id="3" name="Picture Placeholder 2"/>
           <p:cNvSpPr>
-            <a:spLocks noGrp="1"/>
+            <a:spLocks noGrp="1" noChangeAspect="1"/>
           </p:cNvSpPr>
           <p:nvPr>
             <p:ph type="pic" idx="1"/>
@@ -2395,16 +2502,18 @@
         </p:nvSpPr>
         <p:spPr>
           <a:xfrm>
-            <a:off x="1792288" y="612775"/>
-            <a:ext cx="5486400" cy="4114800"/>
+            <a:off x="5413248" y="1069847"/>
+            <a:ext cx="6099048" cy="4800600"/>
           </a:xfrm>
         </p:spPr>
         <p:txBody>
-          <a:bodyPr/>
+          <a:bodyPr lIns="274320" tIns="182880" anchor="t">
+            <a:normAutofit/>
+          </a:bodyPr>
           <a:lstStyle>
             <a:lvl1pPr marL="0" indent="0">
               <a:buNone/>
-              <a:defRPr sz="3200"/>
+              <a:defRPr sz="2800"/>
             </a:lvl1pPr>
             <a:lvl2pPr marL="457200" indent="0">
               <a:buNone/>
@@ -2440,7 +2549,11 @@
             </a:lvl9pPr>
           </a:lstStyle>
           <a:p>
-            <a:endParaRPr lang="en-US"/>
+            <a:r>
+              <a:rPr lang="en-US"/>
+              <a:t>Click icon to add picture</a:t>
+            </a:r>
+            <a:endParaRPr lang="en-US" dirty="0"/>
           </a:p>
         </p:txBody>
       </p:sp>
@@ -2456,16 +2569,24 @@
         </p:nvSpPr>
         <p:spPr>
           <a:xfrm>
-            <a:off x="1792288" y="5367338"/>
-            <a:ext cx="5486400" cy="804862"/>
+            <a:off x="1143000" y="2834640"/>
+            <a:ext cx="3931920" cy="2880360"/>
           </a:xfrm>
         </p:spPr>
         <p:txBody>
-          <a:bodyPr/>
+          <a:bodyPr>
+            <a:normAutofit/>
+          </a:bodyPr>
           <a:lstStyle>
             <a:lvl1pPr marL="0" indent="0">
-              <a:buNone/>
-              <a:defRPr sz="1400"/>
+              <a:lnSpc>
+                <a:spcPct val="100000"/>
+              </a:lnSpc>
+              <a:spcBef>
+                <a:spcPts val="1000"/>
+              </a:spcBef>
+              <a:buNone/>
+              <a:defRPr sz="1700"/>
             </a:lvl1pPr>
             <a:lvl2pPr marL="457200" indent="0">
               <a:buNone/>
@@ -2503,7 +2624,7 @@
           <a:p>
             <a:pPr lvl="0"/>
             <a:r>
-              <a:rPr lang="en-US" smtClean="0"/>
+              <a:rPr lang="en-US"/>
               <a:t>Click to edit Master text styles</a:t>
             </a:r>
           </a:p>
@@ -2524,11 +2645,11 @@
           <a:bodyPr/>
           <a:lstStyle/>
           <a:p>
-            <a:fld id="{241EB5C9-1307-BA42-ABA2-0BC069CD8E7F}" type="datetimeFigureOut">
-              <a:rPr lang="en-US" smtClean="0"/>
-              <a:t>2/17/2018</a:t>
+            <a:fld id="{96DFF08F-DC6B-4601-B491-B0F83F6DD2DA}" type="datetimeFigureOut">
+              <a:rPr lang="en-US" dirty="0"/>
+              <a:t>3/31/2019</a:t>
             </a:fld>
-            <a:endParaRPr lang="en-US"/>
+            <a:endParaRPr lang="en-US" dirty="0"/>
           </a:p>
         </p:txBody>
       </p:sp>
@@ -2547,7 +2668,7 @@
           <a:bodyPr/>
           <a:lstStyle/>
           <a:p>
-            <a:endParaRPr lang="en-US"/>
+            <a:endParaRPr lang="en-US" dirty="0"/>
           </a:p>
         </p:txBody>
       </p:sp>
@@ -2566,18 +2687,18 @@
           <a:bodyPr/>
           <a:lstStyle/>
           <a:p>
-            <a:fld id="{C5EF2332-01BF-834F-8236-50238282D533}" type="slidenum">
-              <a:rPr lang="en-US" smtClean="0"/>
+            <a:fld id="{4FAB73BC-B049-4115-A692-8D63A059BFB8}" type="slidenum">
+              <a:rPr lang="en-US" dirty="0"/>
               <a:t>‹#›</a:t>
             </a:fld>
-            <a:endParaRPr lang="en-US"/>
+            <a:endParaRPr lang="en-US" dirty="0"/>
           </a:p>
         </p:txBody>
       </p:sp>
     </p:spTree>
     <p:extLst>
       <p:ext uri="{BB962C8B-B14F-4D97-AF65-F5344CB8AC3E}">
-        <p14:creationId xmlns:p14="http://schemas.microsoft.com/office/powerpoint/2010/main" val="3566899855"/>
+        <p14:creationId xmlns:p14="http://schemas.microsoft.com/office/powerpoint/2010/main" val="3638612230"/>
       </p:ext>
     </p:extLst>
   </p:cSld>
@@ -2588,12 +2709,15 @@
 </file>
 
 <file path=ppt/slideMasters/slideMaster1.xml><?xml version="1.0" encoding="utf-8"?>
-<p:sldMaster xmlns:a="http://schemas.openxmlformats.org/drawingml/2006/main" xmlns:r="http://schemas.openxmlformats.org/officeDocument/2006/relationships" xmlns:p="http://schemas.openxmlformats.org/presentationml/2006/main">
+<p:sldMaster xmlns:a="http://schemas.openxmlformats.org/drawingml/2006/main" xmlns:r="http://schemas.openxmlformats.org/officeDocument/2006/relationships" xmlns:p="http://schemas.openxmlformats.org/presentationml/2006/main" preserve="1">
   <p:cSld>
     <p:bg>
-      <p:bgRef idx="1001">
-        <a:schemeClr val="bg1"/>
-      </p:bgRef>
+      <p:bgPr>
+        <a:solidFill>
+          <a:schemeClr val="accent1"/>
+        </a:solidFill>
+        <a:effectLst/>
+      </p:bgPr>
     </p:bg>
     <p:spTree>
       <p:nvGrpSpPr>
@@ -2611,18 +2735,58 @@
       </p:grpSpPr>
       <p:sp>
         <p:nvSpPr>
-          <p:cNvPr id="2" name="Title Placeholder 1"/>
-          <p:cNvSpPr>
-            <a:spLocks noGrp="1"/>
-          </p:cNvSpPr>
-          <p:nvPr>
-            <p:ph type="title"/>
-          </p:nvPr>
+          <p:cNvPr id="7" name="Rectangle 6"/>
+          <p:cNvSpPr>
+            <a:spLocks noChangeAspect="1"/>
+          </p:cNvSpPr>
+          <p:nvPr/>
         </p:nvSpPr>
         <p:spPr>
           <a:xfrm>
-            <a:off x="457200" y="274638"/>
-            <a:ext cx="8229600" cy="1143000"/>
+            <a:off x="231140" y="243840"/>
+            <a:ext cx="11724640" cy="6377939"/>
+          </a:xfrm>
+          <a:prstGeom prst="rect">
+            <a:avLst/>
+          </a:prstGeom>
+          <a:solidFill>
+            <a:schemeClr val="bg1"/>
+          </a:solidFill>
+          <a:ln w="12700">
+            <a:noFill/>
+          </a:ln>
+        </p:spPr>
+        <p:style>
+          <a:lnRef idx="2">
+            <a:schemeClr val="accent1">
+              <a:shade val="50000"/>
+            </a:schemeClr>
+          </a:lnRef>
+          <a:fillRef idx="1">
+            <a:schemeClr val="accent1"/>
+          </a:fillRef>
+          <a:effectRef idx="0">
+            <a:schemeClr val="accent1"/>
+          </a:effectRef>
+          <a:fontRef idx="minor">
+            <a:schemeClr val="lt1"/>
+          </a:fontRef>
+        </p:style>
+      </p:sp>
+      <p:sp>
+        <p:nvSpPr>
+          <p:cNvPr id="2" name="Title Placeholder 1"/>
+          <p:cNvSpPr>
+            <a:spLocks noGrp="1"/>
+          </p:cNvSpPr>
+          <p:nvPr>
+            <p:ph type="title"/>
+          </p:nvPr>
+        </p:nvSpPr>
+        <p:spPr>
+          <a:xfrm>
+            <a:off x="387706" y="397459"/>
+            <a:ext cx="11397080" cy="922021"/>
           </a:xfrm>
           <a:prstGeom prst="rect">
             <a:avLst/>
@@ -2635,10 +2799,9 @@
           <a:lstStyle/>
           <a:p>
             <a:r>
-              <a:rPr lang="en-US" smtClean="0"/>
+              <a:rPr lang="en-US" dirty="0"/>
               <a:t>Click to edit Master title style</a:t>
             </a:r>
-            <a:endParaRPr lang="en-US"/>
           </a:p>
         </p:txBody>
       </p:sp>
@@ -2654,8 +2817,8 @@
         </p:nvSpPr>
         <p:spPr>
           <a:xfrm>
-            <a:off x="457200" y="1600200"/>
-            <a:ext cx="8229600" cy="4525963"/>
+            <a:off x="387706" y="1536192"/>
+            <a:ext cx="11397081" cy="4559808"/>
           </a:xfrm>
           <a:prstGeom prst="rect">
             <a:avLst/>
@@ -2669,38 +2832,37 @@
           <a:p>
             <a:pPr lvl="0"/>
             <a:r>
-              <a:rPr lang="en-US" smtClean="0"/>
+              <a:rPr lang="en-US" dirty="0"/>
               <a:t>Click to edit Master text styles</a:t>
             </a:r>
           </a:p>
           <a:p>
             <a:pPr lvl="1"/>
             <a:r>
-              <a:rPr lang="en-US" smtClean="0"/>
+              <a:rPr lang="en-US" dirty="0"/>
               <a:t>Second level</a:t>
             </a:r>
           </a:p>
           <a:p>
             <a:pPr lvl="2"/>
             <a:r>
-              <a:rPr lang="en-US" smtClean="0"/>
+              <a:rPr lang="en-US" dirty="0"/>
               <a:t>Third level</a:t>
             </a:r>
           </a:p>
           <a:p>
             <a:pPr lvl="3"/>
             <a:r>
-              <a:rPr lang="en-US" smtClean="0"/>
+              <a:rPr lang="en-US" dirty="0"/>
               <a:t>Fourth level</a:t>
             </a:r>
           </a:p>
           <a:p>
             <a:pPr lvl="4"/>
             <a:r>
-              <a:rPr lang="en-US" smtClean="0"/>
+              <a:rPr lang="en-US" dirty="0"/>
               <a:t>Fifth level</a:t>
             </a:r>
-            <a:endParaRPr lang="en-US"/>
           </a:p>
         </p:txBody>
       </p:sp>
@@ -2716,8 +2878,8 @@
         </p:nvSpPr>
         <p:spPr>
           <a:xfrm>
-            <a:off x="457200" y="6356350"/>
-            <a:ext cx="2133600" cy="365125"/>
+            <a:off x="1142996" y="6223828"/>
+            <a:ext cx="2329074" cy="365125"/>
           </a:xfrm>
           <a:prstGeom prst="rect">
             <a:avLst/>
@@ -2729,19 +2891,18 @@
             <a:lvl1pPr algn="l">
               <a:defRPr sz="1200">
                 <a:solidFill>
-                  <a:schemeClr val="tx1">
-                    <a:tint val="75000"/>
-                  </a:schemeClr>
+                  <a:schemeClr val="accent1"/>
                 </a:solidFill>
               </a:defRPr>
             </a:lvl1pPr>
           </a:lstStyle>
           <a:p>
-            <a:fld id="{241EB5C9-1307-BA42-ABA2-0BC069CD8E7F}" type="datetimeFigureOut">
-              <a:rPr lang="en-US" smtClean="0"/>
-              <a:t>2/17/2018</a:t>
+            <a:fld id="{96DFF08F-DC6B-4601-B491-B0F83F6DD2DA}" type="datetimeFigureOut">
+              <a:rPr lang="en-US" dirty="0"/>
+              <a:pPr/>
+              <a:t>3/31/2019</a:t>
             </a:fld>
-            <a:endParaRPr lang="en-US"/>
+            <a:endParaRPr lang="en-US" dirty="0"/>
           </a:p>
         </p:txBody>
       </p:sp>
@@ -2757,8 +2918,8 @@
         </p:nvSpPr>
         <p:spPr>
           <a:xfrm>
-            <a:off x="3124200" y="6356350"/>
-            <a:ext cx="2895600" cy="365125"/>
+            <a:off x="3949148" y="6223828"/>
+            <a:ext cx="4717774" cy="365125"/>
           </a:xfrm>
           <a:prstGeom prst="rect">
             <a:avLst/>
@@ -2770,15 +2931,13 @@
             <a:lvl1pPr algn="ctr">
               <a:defRPr sz="1200">
                 <a:solidFill>
-                  <a:schemeClr val="tx1">
-                    <a:tint val="75000"/>
-                  </a:schemeClr>
+                  <a:schemeClr val="accent1"/>
                 </a:solidFill>
               </a:defRPr>
             </a:lvl1pPr>
           </a:lstStyle>
           <a:p>
-            <a:endParaRPr lang="en-US"/>
+            <a:endParaRPr lang="en-US" dirty="0"/>
           </a:p>
         </p:txBody>
       </p:sp>
@@ -2794,8 +2953,8 @@
         </p:nvSpPr>
         <p:spPr>
           <a:xfrm>
-            <a:off x="6553200" y="6356350"/>
-            <a:ext cx="2133600" cy="365125"/>
+            <a:off x="9329530" y="6223828"/>
+            <a:ext cx="1706217" cy="365125"/>
           </a:xfrm>
           <a:prstGeom prst="rect">
             <a:avLst/>
@@ -2807,53 +2966,55 @@
             <a:lvl1pPr algn="r">
               <a:defRPr sz="1200">
                 <a:solidFill>
-                  <a:schemeClr val="tx1">
-                    <a:tint val="75000"/>
-                  </a:schemeClr>
+                  <a:schemeClr val="accent1"/>
                 </a:solidFill>
               </a:defRPr>
             </a:lvl1pPr>
           </a:lstStyle>
           <a:p>
-            <a:fld id="{C5EF2332-01BF-834F-8236-50238282D533}" type="slidenum">
-              <a:rPr lang="en-US" smtClean="0"/>
+            <a:fld id="{4FAB73BC-B049-4115-A692-8D63A059BFB8}" type="slidenum">
+              <a:rPr lang="en-US" dirty="0"/>
+              <a:pPr/>
               <a:t>‹#›</a:t>
             </a:fld>
-            <a:endParaRPr lang="en-US"/>
+            <a:endParaRPr lang="en-US" dirty="0"/>
           </a:p>
         </p:txBody>
       </p:sp>
     </p:spTree>
     <p:extLst>
       <p:ext uri="{BB962C8B-B14F-4D97-AF65-F5344CB8AC3E}">
-        <p14:creationId xmlns:p14="http://schemas.microsoft.com/office/powerpoint/2010/main" val="3676200875"/>
+        <p14:creationId xmlns:p14="http://schemas.microsoft.com/office/powerpoint/2010/main" val="2525122125"/>
       </p:ext>
     </p:extLst>
   </p:cSld>
   <p:clrMap bg1="lt1" tx1="dk1" bg2="lt2" tx2="dk2" accent1="accent1" accent2="accent2" accent3="accent3" accent4="accent4" accent5="accent5" accent6="accent6" hlink="hlink" folHlink="folHlink"/>
   <p:sldLayoutIdLst>
-    <p:sldLayoutId id="2147483649" r:id="rId1"/>
-    <p:sldLayoutId id="2147483650" r:id="rId2"/>
-    <p:sldLayoutId id="2147483651" r:id="rId3"/>
-    <p:sldLayoutId id="2147483652" r:id="rId4"/>
-    <p:sldLayoutId id="2147483653" r:id="rId5"/>
-    <p:sldLayoutId id="2147483654" r:id="rId6"/>
-    <p:sldLayoutId id="2147483655" r:id="rId7"/>
-    <p:sldLayoutId id="2147483656" r:id="rId8"/>
-    <p:sldLayoutId id="2147483657" r:id="rId9"/>
-    <p:sldLayoutId id="2147483658" r:id="rId10"/>
-    <p:sldLayoutId id="2147483659" r:id="rId11"/>
+    <p:sldLayoutId id="2147484193" r:id="rId1"/>
+    <p:sldLayoutId id="2147484194" r:id="rId2"/>
+    <p:sldLayoutId id="2147484195" r:id="rId3"/>
+    <p:sldLayoutId id="2147484196" r:id="rId4"/>
+    <p:sldLayoutId id="2147484197" r:id="rId5"/>
+    <p:sldLayoutId id="2147484198" r:id="rId6"/>
+    <p:sldLayoutId id="2147484199" r:id="rId7"/>
+    <p:sldLayoutId id="2147484200" r:id="rId8"/>
+    <p:sldLayoutId id="2147484201" r:id="rId9"/>
+    <p:sldLayoutId id="2147484202" r:id="rId10"/>
+    <p:sldLayoutId id="2147484203" r:id="rId11"/>
   </p:sldLayoutIdLst>
   <p:txStyles>
     <p:titleStyle>
-      <a:lvl1pPr algn="ctr" defTabSz="457200" rtl="0" eaLnBrk="1" latinLnBrk="0" hangingPunct="1">
+      <a:lvl1pPr algn="l" defTabSz="914400" rtl="0" eaLnBrk="1" latinLnBrk="0" hangingPunct="1">
+        <a:lnSpc>
+          <a:spcPct val="90000"/>
+        </a:lnSpc>
         <a:spcBef>
           <a:spcPct val="0"/>
         </a:spcBef>
         <a:buNone/>
         <a:defRPr sz="4400" kern="1200">
           <a:solidFill>
-            <a:schemeClr val="tx1"/>
+            <a:schemeClr val="accent1"/>
           </a:solidFill>
           <a:latin typeface="+mj-lt"/>
           <a:ea typeface="+mj-ea"/>
@@ -2862,135 +3023,222 @@
       </a:lvl1pPr>
     </p:titleStyle>
     <p:bodyStyle>
-      <a:lvl1pPr marL="342900" indent="-342900" algn="l" defTabSz="457200" rtl="0" eaLnBrk="1" latinLnBrk="0" hangingPunct="1">
+      <a:lvl1pPr marL="228600" indent="-182880" algn="l" defTabSz="914400" rtl="0" eaLnBrk="1" latinLnBrk="0" hangingPunct="1">
+        <a:lnSpc>
+          <a:spcPct val="90000"/>
+        </a:lnSpc>
         <a:spcBef>
-          <a:spcPct val="20000"/>
+          <a:spcPts val="1400"/>
         </a:spcBef>
-        <a:buFont typeface="Arial"/>
+        <a:buClr>
+          <a:schemeClr val="accent1"/>
+        </a:buClr>
+        <a:buSzPct val="80000"/>
+        <a:buFont typeface="Corbel" pitchFamily="34" charset="0"/>
         <a:buChar char="•"/>
-        <a:defRPr sz="3200" kern="1200">
+        <a:defRPr sz="2200" kern="1200">
           <a:solidFill>
-            <a:schemeClr val="tx1"/>
+            <a:schemeClr val="accent1"/>
           </a:solidFill>
           <a:latin typeface="+mn-lt"/>
           <a:ea typeface="+mn-ea"/>
           <a:cs typeface="+mn-cs"/>
         </a:defRPr>
       </a:lvl1pPr>
-      <a:lvl2pPr marL="742950" indent="-285750" algn="l" defTabSz="457200" rtl="0" eaLnBrk="1" latinLnBrk="0" hangingPunct="1">
+      <a:lvl2pPr marL="457200" indent="-182880" algn="l" defTabSz="914400" rtl="0" eaLnBrk="1" latinLnBrk="0" hangingPunct="1">
+        <a:lnSpc>
+          <a:spcPct val="90000"/>
+        </a:lnSpc>
         <a:spcBef>
-          <a:spcPct val="20000"/>
+          <a:spcPts val="200"/>
         </a:spcBef>
-        <a:buFont typeface="Arial"/>
-        <a:buChar char="–"/>
-        <a:defRPr sz="2800" kern="1200">
+        <a:spcAft>
+          <a:spcPts val="400"/>
+        </a:spcAft>
+        <a:buClr>
+          <a:schemeClr val="accent1"/>
+        </a:buClr>
+        <a:buSzPct val="80000"/>
+        <a:buFont typeface="Corbel" pitchFamily="34" charset="0"/>
+        <a:buChar char="•"/>
+        <a:defRPr sz="2000" kern="1200">
           <a:solidFill>
-            <a:schemeClr val="tx1"/>
+            <a:schemeClr val="accent1"/>
           </a:solidFill>
           <a:latin typeface="+mn-lt"/>
           <a:ea typeface="+mn-ea"/>
           <a:cs typeface="+mn-cs"/>
         </a:defRPr>
       </a:lvl2pPr>
-      <a:lvl3pPr marL="1143000" indent="-228600" algn="l" defTabSz="457200" rtl="0" eaLnBrk="1" latinLnBrk="0" hangingPunct="1">
+      <a:lvl3pPr marL="731520" indent="-182880" algn="l" defTabSz="914400" rtl="0" eaLnBrk="1" latinLnBrk="0" hangingPunct="1">
+        <a:lnSpc>
+          <a:spcPct val="90000"/>
+        </a:lnSpc>
         <a:spcBef>
-          <a:spcPct val="20000"/>
+          <a:spcPts val="200"/>
         </a:spcBef>
-        <a:buFont typeface="Arial"/>
+        <a:spcAft>
+          <a:spcPts val="400"/>
+        </a:spcAft>
+        <a:buClr>
+          <a:schemeClr val="accent1"/>
+        </a:buClr>
+        <a:buSzPct val="80000"/>
+        <a:buFont typeface="Corbel" pitchFamily="34" charset="0"/>
         <a:buChar char="•"/>
-        <a:defRPr sz="2400" kern="1200">
+        <a:defRPr sz="1800" kern="1200">
           <a:solidFill>
-            <a:schemeClr val="tx1"/>
+            <a:schemeClr val="accent1"/>
           </a:solidFill>
           <a:latin typeface="+mn-lt"/>
           <a:ea typeface="+mn-ea"/>
           <a:cs typeface="+mn-cs"/>
         </a:defRPr>
       </a:lvl3pPr>
-      <a:lvl4pPr marL="1600200" indent="-228600" algn="l" defTabSz="457200" rtl="0" eaLnBrk="1" latinLnBrk="0" hangingPunct="1">
+      <a:lvl4pPr marL="1005840" indent="-182880" algn="l" defTabSz="914400" rtl="0" eaLnBrk="1" latinLnBrk="0" hangingPunct="1">
+        <a:lnSpc>
+          <a:spcPct val="90000"/>
+        </a:lnSpc>
         <a:spcBef>
-          <a:spcPct val="20000"/>
+          <a:spcPts val="200"/>
         </a:spcBef>
-        <a:buFont typeface="Arial"/>
-        <a:buChar char="–"/>
-        <a:defRPr sz="2000" kern="1200">
+        <a:spcAft>
+          <a:spcPts val="400"/>
+        </a:spcAft>
+        <a:buClr>
+          <a:schemeClr val="accent1"/>
+        </a:buClr>
+        <a:buSzPct val="80000"/>
+        <a:buFont typeface="Corbel" pitchFamily="34" charset="0"/>
+        <a:buChar char="•"/>
+        <a:defRPr sz="1600" kern="1200">
           <a:solidFill>
-            <a:schemeClr val="tx1"/>
+            <a:schemeClr val="accent1"/>
           </a:solidFill>
           <a:latin typeface="+mn-lt"/>
           <a:ea typeface="+mn-ea"/>
           <a:cs typeface="+mn-cs"/>
         </a:defRPr>
       </a:lvl4pPr>
-      <a:lvl5pPr marL="2057400" indent="-228600" algn="l" defTabSz="457200" rtl="0" eaLnBrk="1" latinLnBrk="0" hangingPunct="1">
+      <a:lvl5pPr marL="1280160" indent="-182880" algn="l" defTabSz="914400" rtl="0" eaLnBrk="1" latinLnBrk="0" hangingPunct="1">
+        <a:lnSpc>
+          <a:spcPct val="90000"/>
+        </a:lnSpc>
         <a:spcBef>
-          <a:spcPct val="20000"/>
+          <a:spcPts val="200"/>
         </a:spcBef>
-        <a:buFont typeface="Arial"/>
-        <a:buChar char="»"/>
-        <a:defRPr sz="2000" kern="1200">
+        <a:spcAft>
+          <a:spcPts val="400"/>
+        </a:spcAft>
+        <a:buClr>
+          <a:schemeClr val="accent1"/>
+        </a:buClr>
+        <a:buSzPct val="80000"/>
+        <a:buFont typeface="Corbel" pitchFamily="34" charset="0"/>
+        <a:buChar char="•"/>
+        <a:defRPr sz="1600" kern="1200">
           <a:solidFill>
-            <a:schemeClr val="tx1"/>
+            <a:schemeClr val="accent1"/>
           </a:solidFill>
           <a:latin typeface="+mn-lt"/>
           <a:ea typeface="+mn-ea"/>
           <a:cs typeface="+mn-cs"/>
         </a:defRPr>
       </a:lvl5pPr>
-      <a:lvl6pPr marL="2514600" indent="-228600" algn="l" defTabSz="457200" rtl="0" eaLnBrk="1" latinLnBrk="0" hangingPunct="1">
+      <a:lvl6pPr marL="1600000" indent="-228600" algn="l" defTabSz="914400" rtl="0" eaLnBrk="1" latinLnBrk="0" hangingPunct="1">
+        <a:lnSpc>
+          <a:spcPct val="90000"/>
+        </a:lnSpc>
         <a:spcBef>
-          <a:spcPct val="20000"/>
+          <a:spcPts val="200"/>
         </a:spcBef>
-        <a:buFont typeface="Arial"/>
+        <a:spcAft>
+          <a:spcPts val="400"/>
+        </a:spcAft>
+        <a:buClr>
+          <a:schemeClr val="accent1"/>
+        </a:buClr>
+        <a:buSzPct val="80000"/>
+        <a:buFont typeface="Corbel" pitchFamily="34" charset="0"/>
         <a:buChar char="•"/>
-        <a:defRPr sz="2000" kern="1200">
+        <a:defRPr sz="1600" kern="1200">
           <a:solidFill>
-            <a:schemeClr val="tx1"/>
+            <a:schemeClr val="accent1"/>
           </a:solidFill>
           <a:latin typeface="+mn-lt"/>
           <a:ea typeface="+mn-ea"/>
           <a:cs typeface="+mn-cs"/>
         </a:defRPr>
       </a:lvl6pPr>
-      <a:lvl7pPr marL="2971800" indent="-228600" algn="l" defTabSz="457200" rtl="0" eaLnBrk="1" latinLnBrk="0" hangingPunct="1">
+      <a:lvl7pPr marL="1900000" indent="-228600" algn="l" defTabSz="914400" rtl="0" eaLnBrk="1" latinLnBrk="0" hangingPunct="1">
+        <a:lnSpc>
+          <a:spcPct val="90000"/>
+        </a:lnSpc>
         <a:spcBef>
-          <a:spcPct val="20000"/>
+          <a:spcPts val="200"/>
         </a:spcBef>
-        <a:buFont typeface="Arial"/>
+        <a:spcAft>
+          <a:spcPts val="400"/>
+        </a:spcAft>
+        <a:buClr>
+          <a:schemeClr val="accent1"/>
+        </a:buClr>
+        <a:buSzPct val="80000"/>
+        <a:buFont typeface="Corbel" pitchFamily="34" charset="0"/>
         <a:buChar char="•"/>
-        <a:defRPr sz="2000" kern="1200">
+        <a:defRPr sz="1600" kern="1200">
           <a:solidFill>
-            <a:schemeClr val="tx1"/>
+            <a:schemeClr val="accent1"/>
           </a:solidFill>
           <a:latin typeface="+mn-lt"/>
           <a:ea typeface="+mn-ea"/>
           <a:cs typeface="+mn-cs"/>
         </a:defRPr>
       </a:lvl7pPr>
-      <a:lvl8pPr marL="3429000" indent="-228600" algn="l" defTabSz="457200" rtl="0" eaLnBrk="1" latinLnBrk="0" hangingPunct="1">
+      <a:lvl8pPr marL="2200000" indent="-228600" algn="l" defTabSz="914400" rtl="0" eaLnBrk="1" latinLnBrk="0" hangingPunct="1">
+        <a:lnSpc>
+          <a:spcPct val="90000"/>
+        </a:lnSpc>
         <a:spcBef>
-          <a:spcPct val="20000"/>
+          <a:spcPts val="200"/>
         </a:spcBef>
-        <a:buFont typeface="Arial"/>
+        <a:spcAft>
+          <a:spcPts val="400"/>
+        </a:spcAft>
+        <a:buClr>
+          <a:schemeClr val="accent1"/>
+        </a:buClr>
+        <a:buSzPct val="80000"/>
+        <a:buFont typeface="Corbel" pitchFamily="34" charset="0"/>
         <a:buChar char="•"/>
-        <a:defRPr sz="2000" kern="1200">
+        <a:defRPr sz="1600" kern="1200">
           <a:solidFill>
-            <a:schemeClr val="tx1"/>
+            <a:schemeClr val="accent1"/>
           </a:solidFill>
           <a:latin typeface="+mn-lt"/>
           <a:ea typeface="+mn-ea"/>
           <a:cs typeface="+mn-cs"/>
         </a:defRPr>
       </a:lvl8pPr>
-      <a:lvl9pPr marL="3886200" indent="-228600" algn="l" defTabSz="457200" rtl="0" eaLnBrk="1" latinLnBrk="0" hangingPunct="1">
+      <a:lvl9pPr marL="2500000" indent="-228600" algn="l" defTabSz="914400" rtl="0" eaLnBrk="1" latinLnBrk="0" hangingPunct="1">
+        <a:lnSpc>
+          <a:spcPct val="90000"/>
+        </a:lnSpc>
         <a:spcBef>
-          <a:spcPct val="20000"/>
+          <a:spcPts val="200"/>
         </a:spcBef>
-        <a:buFont typeface="Arial"/>
+        <a:spcAft>
+          <a:spcPts val="400"/>
+        </a:spcAft>
+        <a:buClr>
+          <a:schemeClr val="accent1"/>
+        </a:buClr>
+        <a:buSzPct val="80000"/>
+        <a:buFont typeface="Corbel" pitchFamily="34" charset="0"/>
         <a:buChar char="•"/>
-        <a:defRPr sz="2000" kern="1200">
+        <a:defRPr sz="1600" kern="1200">
           <a:solidFill>
-            <a:schemeClr val="tx1"/>
+            <a:schemeClr val="accent1"/>
           </a:solidFill>
           <a:latin typeface="+mn-lt"/>
           <a:ea typeface="+mn-ea"/>
@@ -3002,7 +3250,7 @@
       <a:defPPr>
         <a:defRPr lang="en-US"/>
       </a:defPPr>
-      <a:lvl1pPr marL="0" algn="l" defTabSz="457200" rtl="0" eaLnBrk="1" latinLnBrk="0" hangingPunct="1">
+      <a:lvl1pPr marL="0" algn="l" defTabSz="914400" rtl="0" eaLnBrk="1" latinLnBrk="0" hangingPunct="1">
         <a:defRPr sz="1800" kern="1200">
           <a:solidFill>
             <a:schemeClr val="tx1"/>
@@ -3012,7 +3260,7 @@
           <a:cs typeface="+mn-cs"/>
         </a:defRPr>
       </a:lvl1pPr>
-      <a:lvl2pPr marL="457200" algn="l" defTabSz="457200" rtl="0" eaLnBrk="1" latinLnBrk="0" hangingPunct="1">
+      <a:lvl2pPr marL="457200" algn="l" defTabSz="914400" rtl="0" eaLnBrk="1" latinLnBrk="0" hangingPunct="1">
         <a:defRPr sz="1800" kern="1200">
           <a:solidFill>
             <a:schemeClr val="tx1"/>
@@ -3022,7 +3270,7 @@
           <a:cs typeface="+mn-cs"/>
         </a:defRPr>
       </a:lvl2pPr>
-      <a:lvl3pPr marL="914400" algn="l" defTabSz="457200" rtl="0" eaLnBrk="1" latinLnBrk="0" hangingPunct="1">
+      <a:lvl3pPr marL="914400" algn="l" defTabSz="914400" rtl="0" eaLnBrk="1" latinLnBrk="0" hangingPunct="1">
         <a:defRPr sz="1800" kern="1200">
           <a:solidFill>
             <a:schemeClr val="tx1"/>
@@ -3032,7 +3280,7 @@
           <a:cs typeface="+mn-cs"/>
         </a:defRPr>
       </a:lvl3pPr>
-      <a:lvl4pPr marL="1371600" algn="l" defTabSz="457200" rtl="0" eaLnBrk="1" latinLnBrk="0" hangingPunct="1">
+      <a:lvl4pPr marL="1371600" algn="l" defTabSz="914400" rtl="0" eaLnBrk="1" latinLnBrk="0" hangingPunct="1">
         <a:defRPr sz="1800" kern="1200">
           <a:solidFill>
             <a:schemeClr val="tx1"/>
@@ -3042,7 +3290,7 @@
           <a:cs typeface="+mn-cs"/>
         </a:defRPr>
       </a:lvl4pPr>
-      <a:lvl5pPr marL="1828800" algn="l" defTabSz="457200" rtl="0" eaLnBrk="1" latinLnBrk="0" hangingPunct="1">
+      <a:lvl5pPr marL="1828800" algn="l" defTabSz="914400" rtl="0" eaLnBrk="1" latinLnBrk="0" hangingPunct="1">
         <a:defRPr sz="1800" kern="1200">
           <a:solidFill>
             <a:schemeClr val="tx1"/>
@@ -3052,7 +3300,7 @@
           <a:cs typeface="+mn-cs"/>
         </a:defRPr>
       </a:lvl5pPr>
-      <a:lvl6pPr marL="2286000" algn="l" defTabSz="457200" rtl="0" eaLnBrk="1" latinLnBrk="0" hangingPunct="1">
+      <a:lvl6pPr marL="2286000" algn="l" defTabSz="914400" rtl="0" eaLnBrk="1" latinLnBrk="0" hangingPunct="1">
         <a:defRPr sz="1800" kern="1200">
           <a:solidFill>
             <a:schemeClr val="tx1"/>
@@ -3062,7 +3310,7 @@
           <a:cs typeface="+mn-cs"/>
         </a:defRPr>
       </a:lvl6pPr>
-      <a:lvl7pPr marL="2743200" algn="l" defTabSz="457200" rtl="0" eaLnBrk="1" latinLnBrk="0" hangingPunct="1">
+      <a:lvl7pPr marL="2743200" algn="l" defTabSz="914400" rtl="0" eaLnBrk="1" latinLnBrk="0" hangingPunct="1">
         <a:defRPr sz="1800" kern="1200">
           <a:solidFill>
             <a:schemeClr val="tx1"/>
@@ -3072,7 +3320,7 @@
           <a:cs typeface="+mn-cs"/>
         </a:defRPr>
       </a:lvl7pPr>
-      <a:lvl8pPr marL="3200400" algn="l" defTabSz="457200" rtl="0" eaLnBrk="1" latinLnBrk="0" hangingPunct="1">
+      <a:lvl8pPr marL="3200400" algn="l" defTabSz="914400" rtl="0" eaLnBrk="1" latinLnBrk="0" hangingPunct="1">
         <a:defRPr sz="1800" kern="1200">
           <a:solidFill>
             <a:schemeClr val="tx1"/>
@@ -3082,7 +3330,7 @@
           <a:cs typeface="+mn-cs"/>
         </a:defRPr>
       </a:lvl8pPr>
-      <a:lvl9pPr marL="3657600" algn="l" defTabSz="457200" rtl="0" eaLnBrk="1" latinLnBrk="0" hangingPunct="1">
+      <a:lvl9pPr marL="3657600" algn="l" defTabSz="914400" rtl="0" eaLnBrk="1" latinLnBrk="0" hangingPunct="1">
         <a:defRPr sz="1800" kern="1200">
           <a:solidFill>
             <a:schemeClr val="tx1"/>
@@ -3126,8 +3374,8 @@
         </p:nvSpPr>
         <p:spPr>
           <a:xfrm>
-            <a:off x="685800" y="2130425"/>
-            <a:ext cx="7772400" cy="1470025"/>
+            <a:off x="1109980" y="882376"/>
+            <a:ext cx="9966960" cy="2926080"/>
           </a:xfrm>
         </p:spPr>
         <p:txBody>
@@ -3172,8 +3420,8 @@
         </p:nvSpPr>
         <p:spPr>
           <a:xfrm>
-            <a:off x="1371600" y="3886200"/>
-            <a:ext cx="6400800" cy="1752600"/>
+            <a:off x="1709530" y="3869634"/>
+            <a:ext cx="8767860" cy="1388165"/>
           </a:xfrm>
         </p:spPr>
         <p:txBody>
@@ -3192,6 +3440,41 @@
           </a:p>
         </p:txBody>
       </p:sp>
+      <p:cxnSp>
+        <p:nvCxnSpPr>
+          <p:cNvPr id="8" name="Straight Connector 7"/>
+          <p:cNvCxnSpPr/>
+          <p:nvPr/>
+        </p:nvCxnSpPr>
+        <p:spPr>
+          <a:xfrm>
+            <a:off x="1978660" y="3733800"/>
+            <a:ext cx="8229601" cy="0"/>
+          </a:xfrm>
+          <a:prstGeom prst="line">
+            <a:avLst/>
+          </a:prstGeom>
+          <a:ln>
+            <a:solidFill>
+              <a:srgbClr val="FFFFFF"/>
+            </a:solidFill>
+          </a:ln>
+        </p:spPr>
+        <p:style>
+          <a:lnRef idx="1">
+            <a:schemeClr val="accent1"/>
+          </a:lnRef>
+          <a:fillRef idx="0">
+            <a:schemeClr val="accent1"/>
+          </a:fillRef>
+          <a:effectRef idx="0">
+            <a:schemeClr val="accent1"/>
+          </a:effectRef>
+          <a:fontRef idx="minor">
+            <a:schemeClr val="tx1"/>
+          </a:fontRef>
+        </p:style>
+      </p:cxnSp>
     </p:spTree>
   </p:cSld>
 </p:sld>
@@ -3279,8 +3562,8 @@
         </p:blipFill>
         <p:spPr bwMode="auto">
           <a:xfrm>
-            <a:off x="1663700" y="1600200"/>
-            <a:ext cx="5816600" cy="4521200"/>
+            <a:off x="1371600" y="1397000"/>
+            <a:ext cx="9398000" cy="4699000"/>
           </a:xfrm>
           <a:prstGeom prst="rect">
             <a:avLst/>
@@ -3342,7 +3625,13 @@
       </p:sp>
       <p:sp>
         <p:nvSpPr>
-          <p:cNvPr id="3" name="Content Placeholder 2"/>
+          <p:cNvPr id="8" name="Text Placeholder 2">
+            <a:extLst>
+              <a:ext uri="{FF2B5EF4-FFF2-40B4-BE49-F238E27FC236}">
+                <a16:creationId xmlns:a16="http://schemas.microsoft.com/office/drawing/2014/main" id="{40AB4180-BC29-450C-85BC-984099FB6C8A}"/>
+              </a:ext>
+            </a:extLst>
+          </p:cNvPr>
           <p:cNvSpPr>
             <a:spLocks noGrp="1"/>
           </p:cNvSpPr>
@@ -3362,13 +3651,16 @@
               <a:rPr sz="1800">
                 <a:latin typeface="Courier"/>
               </a:rPr>
-              <a:t>## 
-## Call:
-## lm(formula = hospitals ~ population, data = hospital_sample)
-## 
-## Coefficients:
-## (Intercept)   population  
-##   7.027e-01    7.907e-06</a:t>
+              <a:t>##  [1] "lm(formula = hospitals ~ population, data = hospital_sample)"  
+##  [2] "Residuals:"                                                    
+##  [3] "     Min       1Q   Median       3Q      Max "                 
+##  [4] "-10.7909  -0.7106   0.0908   0.2498   8.3805 "                 
+##  [5] "Coefficients:"                                                 
+##  [6] "             Estimate Std. Error t value Pr(&gt;|t|)    "         
+##  [7] "(Intercept) 7.027e-01  3.942e-02   17.83   &lt;2e-16 ***"         
+##  [8] "population  7.907e-06  1.182e-07   66.90   &lt;2e-16 ***"         
+##  [9] "---"                                                           
+## [10] "Signif. codes:  0 '***' 0.001 '**' 0.01 '*' 0.05 '.' 0.1 ' ' 1"</a:t>
             </a:r>
           </a:p>
         </p:txBody>
@@ -3452,8 +3744,8 @@
         </p:blipFill>
         <p:spPr bwMode="auto">
           <a:xfrm>
-            <a:off x="1663700" y="1600200"/>
-            <a:ext cx="5816600" cy="4521200"/>
+            <a:off x="1371600" y="1397000"/>
+            <a:ext cx="9398000" cy="4699000"/>
           </a:xfrm>
           <a:prstGeom prst="rect">
             <a:avLst/>
@@ -3472,7 +3764,7 @@
 </file>
 
 <file path=ppt/theme/theme1.xml><?xml version="1.0" encoding="utf-8"?>
-<a:theme xmlns:a="http://schemas.openxmlformats.org/drawingml/2006/main" name="Office Theme">
+<a:theme xmlns:a="http://schemas.openxmlformats.org/drawingml/2006/main" name="Basis">
   <a:themeElements>
     <a:clrScheme name="Office">
       <a:dk1>
@@ -3482,83 +3774,48 @@
         <a:sysClr val="window" lastClr="FFFFFF"/>
       </a:lt1>
       <a:dk2>
-        <a:srgbClr val="1F497D"/>
+        <a:srgbClr val="44546A"/>
       </a:dk2>
       <a:lt2>
-        <a:srgbClr val="EEECE1"/>
+        <a:srgbClr val="E7E6E6"/>
       </a:lt2>
       <a:accent1>
-        <a:srgbClr val="4F81BD"/>
+        <a:srgbClr val="4472C4"/>
       </a:accent1>
       <a:accent2>
-        <a:srgbClr val="C0504D"/>
+        <a:srgbClr val="ED7D31"/>
       </a:accent2>
       <a:accent3>
-        <a:srgbClr val="9BBB59"/>
+        <a:srgbClr val="A5A5A5"/>
       </a:accent3>
       <a:accent4>
-        <a:srgbClr val="8064A2"/>
+        <a:srgbClr val="FFC000"/>
       </a:accent4>
       <a:accent5>
-        <a:srgbClr val="4BACC6"/>
+        <a:srgbClr val="5B9BD5"/>
       </a:accent5>
       <a:accent6>
-        <a:srgbClr val="F79646"/>
+        <a:srgbClr val="70AD47"/>
       </a:accent6>
       <a:hlink>
-        <a:srgbClr val="0000FF"/>
+        <a:srgbClr val="0563C1"/>
       </a:hlink>
       <a:folHlink>
-        <a:srgbClr val="800080"/>
+        <a:srgbClr val="954F72"/>
       </a:folHlink>
     </a:clrScheme>
-    <a:fontScheme name="Office">
+    <a:fontScheme name="Basis">
       <a:majorFont>
-        <a:latin typeface="Calibri"/>
+        <a:latin typeface="Corbel" panose="020B0503020204020204"/>
         <a:ea typeface=""/>
         <a:cs typeface=""/>
-        <a:font script="Jpan" typeface="ＭＳ Ｐゴシック"/>
+        <a:font script="Jpan" typeface="ＭＳ ゴシック"/>
         <a:font script="Hang" typeface="맑은 고딕"/>
         <a:font script="Hans" typeface="宋体"/>
         <a:font script="Hant" typeface="新細明體"/>
-        <a:font script="Arab" typeface="Times New Roman"/>
-        <a:font script="Hebr" typeface="Times New Roman"/>
-        <a:font script="Thai" typeface="Angsana New"/>
-        <a:font script="Ethi" typeface="Nyala"/>
-        <a:font script="Beng" typeface="Vrinda"/>
-        <a:font script="Gujr" typeface="Shruti"/>
-        <a:font script="Khmr" typeface="MoolBoran"/>
-        <a:font script="Knda" typeface="Tunga"/>
-        <a:font script="Guru" typeface="Raavi"/>
-        <a:font script="Cans" typeface="Euphemia"/>
-        <a:font script="Cher" typeface="Plantagenet Cherokee"/>
-        <a:font script="Yiii" typeface="Microsoft Yi Baiti"/>
-        <a:font script="Tibt" typeface="Microsoft Himalaya"/>
-        <a:font script="Thaa" typeface="MV Boli"/>
-        <a:font script="Deva" typeface="Mangal"/>
-        <a:font script="Telu" typeface="Gautami"/>
-        <a:font script="Taml" typeface="Latha"/>
-        <a:font script="Syrc" typeface="Estrangelo Edessa"/>
-        <a:font script="Orya" typeface="Kalinga"/>
-        <a:font script="Mlym" typeface="Kartika"/>
-        <a:font script="Laoo" typeface="DokChampa"/>
-        <a:font script="Sinh" typeface="Iskoola Pota"/>
-        <a:font script="Mong" typeface="Mongolian Baiti"/>
-        <a:font script="Viet" typeface="Times New Roman"/>
-        <a:font script="Uigh" typeface="Microsoft Uighur"/>
-        <a:font script="Geor" typeface="Sylfaen"/>
-      </a:majorFont>
-      <a:minorFont>
-        <a:latin typeface="Calibri"/>
-        <a:ea typeface=""/>
-        <a:cs typeface=""/>
-        <a:font script="Jpan" typeface="ＭＳ Ｐゴシック"/>
-        <a:font script="Hang" typeface="맑은 고딕"/>
-        <a:font script="Hans" typeface="宋体"/>
-        <a:font script="Hant" typeface="新細明體"/>
-        <a:font script="Arab" typeface="Arial"/>
-        <a:font script="Hebr" typeface="Arial"/>
-        <a:font script="Thai" typeface="Cordia New"/>
+        <a:font script="Arab" typeface="Tahoma"/>
+        <a:font script="Hebr" typeface="Gisha"/>
+        <a:font script="Thai" typeface="DilleniaUPC"/>
         <a:font script="Ethi" typeface="Nyala"/>
         <a:font script="Beng" typeface="Vrinda"/>
         <a:font script="Gujr" typeface="Shruti"/>
@@ -3579,76 +3836,94 @@
         <a:font script="Laoo" typeface="DokChampa"/>
         <a:font script="Sinh" typeface="Iskoola Pota"/>
         <a:font script="Mong" typeface="Mongolian Baiti"/>
-        <a:font script="Viet" typeface="Arial"/>
+        <a:font script="Viet" typeface="Tahoma"/>
+        <a:font script="Uigh" typeface="Microsoft Uighur"/>
+        <a:font script="Geor" typeface="Sylfaen"/>
+      </a:majorFont>
+      <a:minorFont>
+        <a:latin typeface="Corbel" panose="020B0503020204020204"/>
+        <a:ea typeface=""/>
+        <a:cs typeface=""/>
+        <a:font script="Jpan" typeface="ＭＳ ゴシック"/>
+        <a:font script="Hang" typeface="맑은 고딕"/>
+        <a:font script="Hans" typeface="宋体"/>
+        <a:font script="Hant" typeface="新細明體"/>
+        <a:font script="Arab" typeface="Tahoma"/>
+        <a:font script="Hebr" typeface="Gisha"/>
+        <a:font script="Thai" typeface="DilleniaUPC"/>
+        <a:font script="Ethi" typeface="Nyala"/>
+        <a:font script="Beng" typeface="Vrinda"/>
+        <a:font script="Gujr" typeface="Shruti"/>
+        <a:font script="Khmr" typeface="DaunPenh"/>
+        <a:font script="Knda" typeface="Tunga"/>
+        <a:font script="Guru" typeface="Raavi"/>
+        <a:font script="Cans" typeface="Euphemia"/>
+        <a:font script="Cher" typeface="Plantagenet Cherokee"/>
+        <a:font script="Yiii" typeface="Microsoft Yi Baiti"/>
+        <a:font script="Tibt" typeface="Microsoft Himalaya"/>
+        <a:font script="Thaa" typeface="MV Boli"/>
+        <a:font script="Deva" typeface="Mangal"/>
+        <a:font script="Telu" typeface="Gautami"/>
+        <a:font script="Taml" typeface="Latha"/>
+        <a:font script="Syrc" typeface="Estrangelo Edessa"/>
+        <a:font script="Orya" typeface="Kalinga"/>
+        <a:font script="Mlym" typeface="Kartika"/>
+        <a:font script="Laoo" typeface="DokChampa"/>
+        <a:font script="Sinh" typeface="Iskoola Pota"/>
+        <a:font script="Mong" typeface="Mongolian Baiti"/>
+        <a:font script="Viet" typeface="Verdana"/>
         <a:font script="Uigh" typeface="Microsoft Uighur"/>
         <a:font script="Geor" typeface="Sylfaen"/>
       </a:minorFont>
     </a:fontScheme>
-    <a:fmtScheme name="Office">
+    <a:fmtScheme name="Basis">
       <a:fillStyleLst>
         <a:solidFill>
           <a:schemeClr val="phClr"/>
         </a:solidFill>
+        <a:solidFill>
+          <a:schemeClr val="phClr">
+            <a:tint val="55000"/>
+            <a:satMod val="130000"/>
+          </a:schemeClr>
+        </a:solidFill>
         <a:gradFill rotWithShape="1">
           <a:gsLst>
             <a:gs pos="0">
+              <a:schemeClr val="phClr"/>
+            </a:gs>
+            <a:gs pos="90000">
               <a:schemeClr val="phClr">
-                <a:tint val="50000"/>
-                <a:satMod val="300000"/>
-              </a:schemeClr>
-            </a:gs>
-            <a:gs pos="35000">
-              <a:schemeClr val="phClr">
-                <a:tint val="37000"/>
-                <a:satMod val="300000"/>
+                <a:shade val="100000"/>
+                <a:satMod val="105000"/>
               </a:schemeClr>
             </a:gs>
             <a:gs pos="100000">
               <a:schemeClr val="phClr">
-                <a:tint val="15000"/>
-                <a:satMod val="350000"/>
+                <a:shade val="80000"/>
+                <a:satMod val="120000"/>
               </a:schemeClr>
             </a:gs>
           </a:gsLst>
-          <a:lin ang="16200000" scaled="1"/>
-        </a:gradFill>
-        <a:gradFill rotWithShape="1">
-          <a:gsLst>
-            <a:gs pos="0">
-              <a:schemeClr val="phClr">
-                <a:tint val="100000"/>
-                <a:shade val="100000"/>
-                <a:satMod val="130000"/>
-              </a:schemeClr>
-            </a:gs>
-            <a:gs pos="100000">
-              <a:schemeClr val="phClr">
-                <a:tint val="50000"/>
-                <a:shade val="100000"/>
-                <a:satMod val="350000"/>
-              </a:schemeClr>
-            </a:gs>
-          </a:gsLst>
-          <a:lin ang="16200000" scaled="0"/>
+          <a:path path="circle">
+            <a:fillToRect l="100000" t="100000" r="100000" b="100000"/>
+          </a:path>
         </a:gradFill>
       </a:fillStyleLst>
       <a:lnStyleLst>
-        <a:ln w="9525" cap="flat" cmpd="sng" algn="ctr">
-          <a:solidFill>
-            <a:schemeClr val="phClr">
-              <a:shade val="95000"/>
-              <a:satMod val="105000"/>
-            </a:schemeClr>
-          </a:solidFill>
-          <a:prstDash val="solid"/>
-        </a:ln>
-        <a:ln w="25400" cap="flat" cmpd="sng" algn="ctr">
+        <a:ln w="10000" cap="flat" cmpd="sng" algn="ctr">
           <a:solidFill>
             <a:schemeClr val="phClr"/>
           </a:solidFill>
           <a:prstDash val="solid"/>
         </a:ln>
-        <a:ln w="38100" cap="flat" cmpd="sng" algn="ctr">
+        <a:ln w="19050" cap="flat" cmpd="sng" algn="ctr">
+          <a:solidFill>
+            <a:schemeClr val="phClr"/>
+          </a:solidFill>
+          <a:prstDash val="solid"/>
+        </a:ln>
+        <a:ln w="53975" cap="flat" cmpd="dbl" algn="ctr">
           <a:solidFill>
             <a:schemeClr val="phClr"/>
           </a:solidFill>
@@ -3657,28 +3932,22 @@
       </a:lnStyleLst>
       <a:effectStyleLst>
         <a:effectStyle>
+          <a:effectLst/>
+        </a:effectStyle>
+        <a:effectStyle>
           <a:effectLst>
-            <a:outerShdw blurRad="40000" dist="20000" dir="5400000" rotWithShape="0">
+            <a:outerShdw blurRad="38100" dist="25400" dir="5400000" rotWithShape="0">
               <a:srgbClr val="000000">
-                <a:alpha val="38000"/>
+                <a:alpha val="45000"/>
               </a:srgbClr>
             </a:outerShdw>
           </a:effectLst>
         </a:effectStyle>
         <a:effectStyle>
           <a:effectLst>
-            <a:outerShdw blurRad="40000" dist="23000" dir="5400000" rotWithShape="0">
+            <a:outerShdw blurRad="38100" dist="25400" dir="5400000" rotWithShape="0">
               <a:srgbClr val="000000">
-                <a:alpha val="35000"/>
-              </a:srgbClr>
-            </a:outerShdw>
-          </a:effectLst>
-        </a:effectStyle>
-        <a:effectStyle>
-          <a:effectLst>
-            <a:outerShdw blurRad="40000" dist="23000" dir="5400000" rotWithShape="0">
-              <a:srgbClr val="000000">
-                <a:alpha val="35000"/>
+                <a:alpha val="45000"/>
               </a:srgbClr>
             </a:outerShdw>
           </a:effectLst>
@@ -3686,12 +3955,16 @@
             <a:camera prst="orthographicFront">
               <a:rot lat="0" lon="0" rev="0"/>
             </a:camera>
-            <a:lightRig rig="threePt" dir="t">
-              <a:rot lat="0" lon="0" rev="1200000"/>
-            </a:lightRig>
+            <a:lightRig rig="brightRoom" dir="t"/>
           </a:scene3d>
-          <a:sp3d>
-            <a:bevelT w="63500" h="25400"/>
+          <a:sp3d extrusionH="12700" contourW="25400" prstMaterial="flat">
+            <a:bevelT w="63500" h="152400" prst="angle"/>
+            <a:contourClr>
+              <a:schemeClr val="phClr">
+                <a:shade val="27000"/>
+                <a:satMod val="120000"/>
+              </a:schemeClr>
+            </a:contourClr>
           </a:sp3d>
         </a:effectStyle>
       </a:effectStyleLst>
@@ -3699,94 +3972,30 @@
         <a:solidFill>
           <a:schemeClr val="phClr"/>
         </a:solidFill>
-        <a:gradFill rotWithShape="1">
-          <a:gsLst>
-            <a:gs pos="0">
-              <a:schemeClr val="phClr">
-                <a:tint val="40000"/>
-                <a:satMod val="350000"/>
-              </a:schemeClr>
-            </a:gs>
-            <a:gs pos="40000">
-              <a:schemeClr val="phClr">
-                <a:tint val="45000"/>
-                <a:shade val="99000"/>
-                <a:satMod val="350000"/>
-              </a:schemeClr>
-            </a:gs>
-            <a:gs pos="100000">
-              <a:schemeClr val="phClr">
-                <a:shade val="20000"/>
-                <a:satMod val="255000"/>
-              </a:schemeClr>
-            </a:gs>
-          </a:gsLst>
-          <a:path path="circle">
-            <a:fillToRect l="50000" t="-80000" r="50000" b="180000"/>
-          </a:path>
-        </a:gradFill>
-        <a:gradFill rotWithShape="1">
-          <a:gsLst>
-            <a:gs pos="0">
-              <a:schemeClr val="phClr">
-                <a:tint val="80000"/>
-                <a:satMod val="300000"/>
-              </a:schemeClr>
-            </a:gs>
-            <a:gs pos="100000">
-              <a:schemeClr val="phClr">
-                <a:shade val="30000"/>
-                <a:satMod val="200000"/>
-              </a:schemeClr>
-            </a:gs>
-          </a:gsLst>
-          <a:path path="circle">
-            <a:fillToRect l="50000" t="50000" r="50000" b="50000"/>
-          </a:path>
-        </a:gradFill>
+        <a:solidFill>
+          <a:schemeClr val="phClr">
+            <a:tint val="95000"/>
+            <a:shade val="95000"/>
+            <a:satMod val="140000"/>
+          </a:schemeClr>
+        </a:solidFill>
+        <a:solidFill>
+          <a:schemeClr val="phClr">
+            <a:tint val="90000"/>
+            <a:shade val="85000"/>
+            <a:satMod val="160000"/>
+            <a:lumMod val="110000"/>
+          </a:schemeClr>
+        </a:solidFill>
       </a:bgFillStyleLst>
     </a:fmtScheme>
   </a:themeElements>
-  <a:objectDefaults>
-    <a:spDef>
-      <a:spPr/>
-      <a:bodyPr/>
-      <a:lstStyle/>
-      <a:style>
-        <a:lnRef idx="1">
-          <a:schemeClr val="accent1"/>
-        </a:lnRef>
-        <a:fillRef idx="3">
-          <a:schemeClr val="accent1"/>
-        </a:fillRef>
-        <a:effectRef idx="2">
-          <a:schemeClr val="accent1"/>
-        </a:effectRef>
-        <a:fontRef idx="minor">
-          <a:schemeClr val="lt1"/>
-        </a:fontRef>
-      </a:style>
-    </a:spDef>
-    <a:lnDef>
-      <a:spPr/>
-      <a:bodyPr/>
-      <a:lstStyle/>
-      <a:style>
-        <a:lnRef idx="2">
-          <a:schemeClr val="accent1"/>
-        </a:lnRef>
-        <a:fillRef idx="0">
-          <a:schemeClr val="accent1"/>
-        </a:fillRef>
-        <a:effectRef idx="1">
-          <a:schemeClr val="accent1"/>
-        </a:effectRef>
-        <a:fontRef idx="minor">
-          <a:schemeClr val="tx1"/>
-        </a:fontRef>
-      </a:style>
-    </a:lnDef>
-  </a:objectDefaults>
+  <a:objectDefaults/>
   <a:extraClrSchemeLst/>
+  <a:extLst>
+    <a:ext uri="{05A4C25C-085E-4340-85A3-A5531E510DB2}">
+      <thm15:themeFamily xmlns:thm15="http://schemas.microsoft.com/office/thememl/2012/main" name="template.potx" id="{3B6CAB17-4B08-403B-9859-FC994D5A8591}" vid="{D2244095-063B-4B7C-AF4E-FFB80AE2CA50}"/>
+    </a:ext>
+  </a:extLst>
 </a:theme>
 </file>
</xml_diff>